<commit_message>
take off the slide of which talking about melod
</commit_message>
<xml_diff>
--- a/How easily to make a POP song.pptx
+++ b/How easily to make a POP song.pptx
@@ -4,14 +4,16 @@
   <p:sldMasterIdLst>
     <p:sldMasterId id="2147483720" r:id="rId1"/>
   </p:sldMasterIdLst>
+  <p:notesMasterIdLst>
+    <p:notesMasterId r:id="rId8"/>
+  </p:notesMasterIdLst>
   <p:sldIdLst>
     <p:sldId id="256" r:id="rId2"/>
     <p:sldId id="259" r:id="rId3"/>
-    <p:sldId id="258" r:id="rId4"/>
-    <p:sldId id="257" r:id="rId5"/>
-    <p:sldId id="260" r:id="rId6"/>
-    <p:sldId id="263" r:id="rId7"/>
-    <p:sldId id="264" r:id="rId8"/>
+    <p:sldId id="257" r:id="rId4"/>
+    <p:sldId id="260" r:id="rId5"/>
+    <p:sldId id="263" r:id="rId6"/>
+    <p:sldId id="264" r:id="rId7"/>
   </p:sldIdLst>
   <p:sldSz cx="12192000" cy="6858000"/>
   <p:notesSz cx="6858000" cy="9144000"/>
@@ -118,6 +120,359 @@
 </p:presentation>
 </file>
 
+<file path=ppt/revisionInfo.xml><?xml version="1.0" encoding="utf-8"?>
+<p1510:revInfo xmlns:a="http://schemas.openxmlformats.org/drawingml/2006/main" xmlns:r="http://schemas.openxmlformats.org/officeDocument/2006/relationships" xmlns:p1510="http://schemas.microsoft.com/office/powerpoint/2015/10/main"/>
+</file>
+
+<file path=ppt/notesMasters/notesMaster1.xml><?xml version="1.0" encoding="utf-8"?>
+<p:notesMaster xmlns:a="http://schemas.openxmlformats.org/drawingml/2006/main" xmlns:r="http://schemas.openxmlformats.org/officeDocument/2006/relationships" xmlns:p="http://schemas.openxmlformats.org/presentationml/2006/main">
+  <p:cSld>
+    <p:bg>
+      <p:bgRef idx="1001">
+        <a:schemeClr val="bg1"/>
+      </p:bgRef>
+    </p:bg>
+    <p:spTree>
+      <p:nvGrpSpPr>
+        <p:cNvPr id="1" name=""/>
+        <p:cNvGrpSpPr/>
+        <p:nvPr/>
+      </p:nvGrpSpPr>
+      <p:grpSpPr>
+        <a:xfrm>
+          <a:off x="0" y="0"/>
+          <a:ext cx="0" cy="0"/>
+          <a:chOff x="0" y="0"/>
+          <a:chExt cx="0" cy="0"/>
+        </a:xfrm>
+      </p:grpSpPr>
+      <p:sp>
+        <p:nvSpPr>
+          <p:cNvPr id="2" name="頁首版面配置區 1"/>
+          <p:cNvSpPr>
+            <a:spLocks noGrp="1"/>
+          </p:cNvSpPr>
+          <p:nvPr>
+            <p:ph type="hdr" sz="quarter"/>
+          </p:nvPr>
+        </p:nvSpPr>
+        <p:spPr>
+          <a:xfrm>
+            <a:off x="0" y="0"/>
+            <a:ext cx="2971800" cy="458788"/>
+          </a:xfrm>
+          <a:prstGeom prst="rect">
+            <a:avLst/>
+          </a:prstGeom>
+        </p:spPr>
+        <p:txBody>
+          <a:bodyPr vert="horz" lIns="91440" tIns="45720" rIns="91440" bIns="45720" rtlCol="0"/>
+          <a:lstStyle>
+            <a:lvl1pPr algn="l">
+              <a:defRPr sz="1200"/>
+            </a:lvl1pPr>
+          </a:lstStyle>
+          <a:p>
+            <a:endParaRPr lang="zh-TW" altLang="en-US"/>
+          </a:p>
+        </p:txBody>
+      </p:sp>
+      <p:sp>
+        <p:nvSpPr>
+          <p:cNvPr id="3" name="日期版面配置區 2"/>
+          <p:cNvSpPr>
+            <a:spLocks noGrp="1"/>
+          </p:cNvSpPr>
+          <p:nvPr>
+            <p:ph type="dt" idx="1"/>
+          </p:nvPr>
+        </p:nvSpPr>
+        <p:spPr>
+          <a:xfrm>
+            <a:off x="3884613" y="0"/>
+            <a:ext cx="2971800" cy="458788"/>
+          </a:xfrm>
+          <a:prstGeom prst="rect">
+            <a:avLst/>
+          </a:prstGeom>
+        </p:spPr>
+        <p:txBody>
+          <a:bodyPr vert="horz" lIns="91440" tIns="45720" rIns="91440" bIns="45720" rtlCol="0"/>
+          <a:lstStyle>
+            <a:lvl1pPr algn="r">
+              <a:defRPr sz="1200"/>
+            </a:lvl1pPr>
+          </a:lstStyle>
+          <a:p>
+            <a:fld id="{CE784C47-07D7-43EA-A006-7485EF729F06}" type="datetimeFigureOut">
+              <a:rPr lang="zh-TW" altLang="en-US" smtClean="0"/>
+              <a:t>2017/6/10</a:t>
+            </a:fld>
+            <a:endParaRPr lang="zh-TW" altLang="en-US"/>
+          </a:p>
+        </p:txBody>
+      </p:sp>
+      <p:sp>
+        <p:nvSpPr>
+          <p:cNvPr id="4" name="投影片影像版面配置區 3"/>
+          <p:cNvSpPr>
+            <a:spLocks noGrp="1" noRot="1" noChangeAspect="1"/>
+          </p:cNvSpPr>
+          <p:nvPr>
+            <p:ph type="sldImg" idx="2"/>
+          </p:nvPr>
+        </p:nvSpPr>
+        <p:spPr>
+          <a:xfrm>
+            <a:off x="685800" y="1143000"/>
+            <a:ext cx="5486400" cy="3086100"/>
+          </a:xfrm>
+          <a:prstGeom prst="rect">
+            <a:avLst/>
+          </a:prstGeom>
+          <a:noFill/>
+          <a:ln w="12700">
+            <a:solidFill>
+              <a:prstClr val="black"/>
+            </a:solidFill>
+          </a:ln>
+        </p:spPr>
+        <p:txBody>
+          <a:bodyPr vert="horz" lIns="91440" tIns="45720" rIns="91440" bIns="45720" rtlCol="0" anchor="ctr"/>
+          <a:lstStyle/>
+          <a:p>
+            <a:endParaRPr lang="zh-TW" altLang="en-US"/>
+          </a:p>
+        </p:txBody>
+      </p:sp>
+      <p:sp>
+        <p:nvSpPr>
+          <p:cNvPr id="5" name="備忘稿版面配置區 4"/>
+          <p:cNvSpPr>
+            <a:spLocks noGrp="1"/>
+          </p:cNvSpPr>
+          <p:nvPr>
+            <p:ph type="body" sz="quarter" idx="3"/>
+          </p:nvPr>
+        </p:nvSpPr>
+        <p:spPr>
+          <a:xfrm>
+            <a:off x="685800" y="4400550"/>
+            <a:ext cx="5486400" cy="3600450"/>
+          </a:xfrm>
+          <a:prstGeom prst="rect">
+            <a:avLst/>
+          </a:prstGeom>
+        </p:spPr>
+        <p:txBody>
+          <a:bodyPr vert="horz" lIns="91440" tIns="45720" rIns="91440" bIns="45720" rtlCol="0"/>
+          <a:lstStyle/>
+          <a:p>
+            <a:pPr lvl="0"/>
+            <a:r>
+              <a:rPr lang="zh-TW" altLang="en-US"/>
+              <a:t>編輯母片文字樣式</a:t>
+            </a:r>
+          </a:p>
+          <a:p>
+            <a:pPr lvl="1"/>
+            <a:r>
+              <a:rPr lang="zh-TW" altLang="en-US"/>
+              <a:t>第二層</a:t>
+            </a:r>
+          </a:p>
+          <a:p>
+            <a:pPr lvl="2"/>
+            <a:r>
+              <a:rPr lang="zh-TW" altLang="en-US"/>
+              <a:t>第三層</a:t>
+            </a:r>
+          </a:p>
+          <a:p>
+            <a:pPr lvl="3"/>
+            <a:r>
+              <a:rPr lang="zh-TW" altLang="en-US"/>
+              <a:t>第四層</a:t>
+            </a:r>
+          </a:p>
+          <a:p>
+            <a:pPr lvl="4"/>
+            <a:r>
+              <a:rPr lang="zh-TW" altLang="en-US"/>
+              <a:t>第五層</a:t>
+            </a:r>
+          </a:p>
+        </p:txBody>
+      </p:sp>
+      <p:sp>
+        <p:nvSpPr>
+          <p:cNvPr id="6" name="頁尾版面配置區 5"/>
+          <p:cNvSpPr>
+            <a:spLocks noGrp="1"/>
+          </p:cNvSpPr>
+          <p:nvPr>
+            <p:ph type="ftr" sz="quarter" idx="4"/>
+          </p:nvPr>
+        </p:nvSpPr>
+        <p:spPr>
+          <a:xfrm>
+            <a:off x="0" y="8685213"/>
+            <a:ext cx="2971800" cy="458787"/>
+          </a:xfrm>
+          <a:prstGeom prst="rect">
+            <a:avLst/>
+          </a:prstGeom>
+        </p:spPr>
+        <p:txBody>
+          <a:bodyPr vert="horz" lIns="91440" tIns="45720" rIns="91440" bIns="45720" rtlCol="0" anchor="b"/>
+          <a:lstStyle>
+            <a:lvl1pPr algn="l">
+              <a:defRPr sz="1200"/>
+            </a:lvl1pPr>
+          </a:lstStyle>
+          <a:p>
+            <a:endParaRPr lang="zh-TW" altLang="en-US"/>
+          </a:p>
+        </p:txBody>
+      </p:sp>
+      <p:sp>
+        <p:nvSpPr>
+          <p:cNvPr id="7" name="投影片編號版面配置區 6"/>
+          <p:cNvSpPr>
+            <a:spLocks noGrp="1"/>
+          </p:cNvSpPr>
+          <p:nvPr>
+            <p:ph type="sldNum" sz="quarter" idx="5"/>
+          </p:nvPr>
+        </p:nvSpPr>
+        <p:spPr>
+          <a:xfrm>
+            <a:off x="3884613" y="8685213"/>
+            <a:ext cx="2971800" cy="458787"/>
+          </a:xfrm>
+          <a:prstGeom prst="rect">
+            <a:avLst/>
+          </a:prstGeom>
+        </p:spPr>
+        <p:txBody>
+          <a:bodyPr vert="horz" lIns="91440" tIns="45720" rIns="91440" bIns="45720" rtlCol="0" anchor="b"/>
+          <a:lstStyle>
+            <a:lvl1pPr algn="r">
+              <a:defRPr sz="1200"/>
+            </a:lvl1pPr>
+          </a:lstStyle>
+          <a:p>
+            <a:fld id="{9F37FC97-BEA4-49D6-A060-79E591A576D9}" type="slidenum">
+              <a:rPr lang="zh-TW" altLang="en-US" smtClean="0"/>
+              <a:t>‹#›</a:t>
+            </a:fld>
+            <a:endParaRPr lang="zh-TW" altLang="en-US"/>
+          </a:p>
+        </p:txBody>
+      </p:sp>
+    </p:spTree>
+    <p:extLst>
+      <p:ext uri="{BB962C8B-B14F-4D97-AF65-F5344CB8AC3E}">
+        <p14:creationId xmlns:p14="http://schemas.microsoft.com/office/powerpoint/2010/main" val="4256280481"/>
+      </p:ext>
+    </p:extLst>
+  </p:cSld>
+  <p:clrMap bg1="lt1" tx1="dk1" bg2="lt2" tx2="dk2" accent1="accent1" accent2="accent2" accent3="accent3" accent4="accent4" accent5="accent5" accent6="accent6" hlink="hlink" folHlink="folHlink"/>
+  <p:notesStyle>
+    <a:lvl1pPr marL="0" algn="l" defTabSz="914400" rtl="0" eaLnBrk="1" latinLnBrk="0" hangingPunct="1">
+      <a:defRPr sz="1200" kern="1200">
+        <a:solidFill>
+          <a:schemeClr val="tx1"/>
+        </a:solidFill>
+        <a:latin typeface="+mn-lt"/>
+        <a:ea typeface="+mn-ea"/>
+        <a:cs typeface="+mn-cs"/>
+      </a:defRPr>
+    </a:lvl1pPr>
+    <a:lvl2pPr marL="457200" algn="l" defTabSz="914400" rtl="0" eaLnBrk="1" latinLnBrk="0" hangingPunct="1">
+      <a:defRPr sz="1200" kern="1200">
+        <a:solidFill>
+          <a:schemeClr val="tx1"/>
+        </a:solidFill>
+        <a:latin typeface="+mn-lt"/>
+        <a:ea typeface="+mn-ea"/>
+        <a:cs typeface="+mn-cs"/>
+      </a:defRPr>
+    </a:lvl2pPr>
+    <a:lvl3pPr marL="914400" algn="l" defTabSz="914400" rtl="0" eaLnBrk="1" latinLnBrk="0" hangingPunct="1">
+      <a:defRPr sz="1200" kern="1200">
+        <a:solidFill>
+          <a:schemeClr val="tx1"/>
+        </a:solidFill>
+        <a:latin typeface="+mn-lt"/>
+        <a:ea typeface="+mn-ea"/>
+        <a:cs typeface="+mn-cs"/>
+      </a:defRPr>
+    </a:lvl3pPr>
+    <a:lvl4pPr marL="1371600" algn="l" defTabSz="914400" rtl="0" eaLnBrk="1" latinLnBrk="0" hangingPunct="1">
+      <a:defRPr sz="1200" kern="1200">
+        <a:solidFill>
+          <a:schemeClr val="tx1"/>
+        </a:solidFill>
+        <a:latin typeface="+mn-lt"/>
+        <a:ea typeface="+mn-ea"/>
+        <a:cs typeface="+mn-cs"/>
+      </a:defRPr>
+    </a:lvl4pPr>
+    <a:lvl5pPr marL="1828800" algn="l" defTabSz="914400" rtl="0" eaLnBrk="1" latinLnBrk="0" hangingPunct="1">
+      <a:defRPr sz="1200" kern="1200">
+        <a:solidFill>
+          <a:schemeClr val="tx1"/>
+        </a:solidFill>
+        <a:latin typeface="+mn-lt"/>
+        <a:ea typeface="+mn-ea"/>
+        <a:cs typeface="+mn-cs"/>
+      </a:defRPr>
+    </a:lvl5pPr>
+    <a:lvl6pPr marL="2286000" algn="l" defTabSz="914400" rtl="0" eaLnBrk="1" latinLnBrk="0" hangingPunct="1">
+      <a:defRPr sz="1200" kern="1200">
+        <a:solidFill>
+          <a:schemeClr val="tx1"/>
+        </a:solidFill>
+        <a:latin typeface="+mn-lt"/>
+        <a:ea typeface="+mn-ea"/>
+        <a:cs typeface="+mn-cs"/>
+      </a:defRPr>
+    </a:lvl6pPr>
+    <a:lvl7pPr marL="2743200" algn="l" defTabSz="914400" rtl="0" eaLnBrk="1" latinLnBrk="0" hangingPunct="1">
+      <a:defRPr sz="1200" kern="1200">
+        <a:solidFill>
+          <a:schemeClr val="tx1"/>
+        </a:solidFill>
+        <a:latin typeface="+mn-lt"/>
+        <a:ea typeface="+mn-ea"/>
+        <a:cs typeface="+mn-cs"/>
+      </a:defRPr>
+    </a:lvl7pPr>
+    <a:lvl8pPr marL="3200400" algn="l" defTabSz="914400" rtl="0" eaLnBrk="1" latinLnBrk="0" hangingPunct="1">
+      <a:defRPr sz="1200" kern="1200">
+        <a:solidFill>
+          <a:schemeClr val="tx1"/>
+        </a:solidFill>
+        <a:latin typeface="+mn-lt"/>
+        <a:ea typeface="+mn-ea"/>
+        <a:cs typeface="+mn-cs"/>
+      </a:defRPr>
+    </a:lvl8pPr>
+    <a:lvl9pPr marL="3657600" algn="l" defTabSz="914400" rtl="0" eaLnBrk="1" latinLnBrk="0" hangingPunct="1">
+      <a:defRPr sz="1200" kern="1200">
+        <a:solidFill>
+          <a:schemeClr val="tx1"/>
+        </a:solidFill>
+        <a:latin typeface="+mn-lt"/>
+        <a:ea typeface="+mn-ea"/>
+        <a:cs typeface="+mn-cs"/>
+      </a:defRPr>
+    </a:lvl9pPr>
+  </p:notesStyle>
+</p:notesMaster>
+</file>
+
 <file path=ppt/slideLayouts/slideLayout1.xml><?xml version="1.0" encoding="utf-8"?>
 <p:sldLayout xmlns:a="http://schemas.openxmlformats.org/drawingml/2006/main" xmlns:r="http://schemas.openxmlformats.org/officeDocument/2006/relationships" xmlns:p="http://schemas.openxmlformats.org/presentationml/2006/main" type="title" preserve="1">
   <p:cSld name="標題投影片">
@@ -160,7 +515,7 @@
           </a:lstStyle>
           <a:p>
             <a:r>
-              <a:rPr lang="zh-TW" altLang="en-US" smtClean="0"/>
+              <a:rPr lang="zh-TW" altLang="en-US"/>
               <a:t>按一下以編輯母片標題樣式</a:t>
             </a:r>
             <a:endParaRPr lang="en-US" dirty="0"/>
@@ -280,7 +635,7 @@
           </a:lstStyle>
           <a:p>
             <a:r>
-              <a:rPr lang="zh-TW" altLang="en-US" smtClean="0"/>
+              <a:rPr lang="zh-TW" altLang="en-US"/>
               <a:t>按一下以編輯母片副標題樣式</a:t>
             </a:r>
             <a:endParaRPr lang="en-US" dirty="0"/>
@@ -302,9 +657,9 @@
           <a:bodyPr/>
           <a:lstStyle/>
           <a:p>
-            <a:fld id="{4E36EFF2-401A-4965-9693-89B521DD1865}" type="datetimeFigureOut">
+            <a:fld id="{BF23EE66-50CA-4C1D-A405-9704449EF623}" type="datetime1">
               <a:rPr lang="zh-TW" altLang="en-US" smtClean="0"/>
-              <a:t>2017/5/15</a:t>
+              <a:t>2017/6/10</a:t>
             </a:fld>
             <a:endParaRPr lang="zh-TW" altLang="en-US"/>
           </a:p>
@@ -409,7 +764,7 @@
           </a:lstStyle>
           <a:p>
             <a:r>
-              <a:rPr lang="zh-TW" altLang="en-US" smtClean="0"/>
+              <a:rPr lang="zh-TW" altLang="en-US"/>
               <a:t>按一下以編輯母片標題樣式</a:t>
             </a:r>
             <a:endParaRPr lang="en-US" dirty="0"/>
@@ -488,7 +843,7 @@
           </a:lstStyle>
           <a:p>
             <a:r>
-              <a:rPr lang="zh-TW" altLang="en-US" smtClean="0"/>
+              <a:rPr lang="zh-TW" altLang="en-US"/>
               <a:t>按一下圖示以新增圖片</a:t>
             </a:r>
             <a:endParaRPr lang="en-US" dirty="0"/>
@@ -556,7 +911,7 @@
           <a:p>
             <a:pPr lvl="0"/>
             <a:r>
-              <a:rPr lang="zh-TW" altLang="en-US" smtClean="0"/>
+              <a:rPr lang="zh-TW" altLang="en-US"/>
               <a:t>按一下以編輯母片文字樣式</a:t>
             </a:r>
           </a:p>
@@ -577,9 +932,9 @@
           <a:bodyPr/>
           <a:lstStyle/>
           <a:p>
-            <a:fld id="{4E36EFF2-401A-4965-9693-89B521DD1865}" type="datetimeFigureOut">
+            <a:fld id="{C4F20955-5DA4-4916-888E-A9B016CE304D}" type="datetime1">
               <a:rPr lang="zh-TW" altLang="en-US" smtClean="0"/>
-              <a:t>2017/5/15</a:t>
+              <a:t>2017/6/10</a:t>
             </a:fld>
             <a:endParaRPr lang="zh-TW" altLang="en-US"/>
           </a:p>
@@ -682,7 +1037,7 @@
           </a:lstStyle>
           <a:p>
             <a:r>
-              <a:rPr lang="zh-TW" altLang="en-US" smtClean="0"/>
+              <a:rPr lang="zh-TW" altLang="en-US"/>
               <a:t>按一下以編輯母片標題樣式</a:t>
             </a:r>
             <a:endParaRPr lang="en-US" dirty="0"/>
@@ -750,7 +1105,7 @@
           <a:p>
             <a:pPr lvl="0"/>
             <a:r>
-              <a:rPr lang="zh-TW" altLang="en-US" smtClean="0"/>
+              <a:rPr lang="zh-TW" altLang="en-US"/>
               <a:t>按一下以編輯母片文字樣式</a:t>
             </a:r>
           </a:p>
@@ -771,9 +1126,9 @@
           <a:bodyPr/>
           <a:lstStyle/>
           <a:p>
-            <a:fld id="{4E36EFF2-401A-4965-9693-89B521DD1865}" type="datetimeFigureOut">
+            <a:fld id="{5E7D629D-FF65-4477-A464-286253C08240}" type="datetime1">
               <a:rPr lang="zh-TW" altLang="en-US" smtClean="0"/>
-              <a:t>2017/5/15</a:t>
+              <a:t>2017/6/10</a:t>
             </a:fld>
             <a:endParaRPr lang="zh-TW" altLang="en-US"/>
           </a:p>
@@ -876,7 +1231,7 @@
           </a:lstStyle>
           <a:p>
             <a:r>
-              <a:rPr lang="zh-TW" altLang="en-US" smtClean="0"/>
+              <a:rPr lang="zh-TW" altLang="en-US"/>
               <a:t>按一下以編輯母片標題樣式</a:t>
             </a:r>
             <a:endParaRPr lang="en-US" dirty="0"/>
@@ -956,7 +1311,7 @@
               <a:buNone/>
             </a:pPr>
             <a:r>
-              <a:rPr lang="zh-TW" altLang="en-US" smtClean="0"/>
+              <a:rPr lang="zh-TW" altLang="en-US"/>
               <a:t>按一下以編輯母片文字樣式</a:t>
             </a:r>
           </a:p>
@@ -1023,7 +1378,7 @@
           <a:p>
             <a:pPr lvl="0"/>
             <a:r>
-              <a:rPr lang="zh-TW" altLang="en-US" smtClean="0"/>
+              <a:rPr lang="zh-TW" altLang="en-US"/>
               <a:t>按一下以編輯母片文字樣式</a:t>
             </a:r>
           </a:p>
@@ -1044,9 +1399,9 @@
           <a:bodyPr/>
           <a:lstStyle/>
           <a:p>
-            <a:fld id="{4E36EFF2-401A-4965-9693-89B521DD1865}" type="datetimeFigureOut">
+            <a:fld id="{E83125AC-9084-4238-828F-43A210294F8D}" type="datetime1">
               <a:rPr lang="zh-TW" altLang="en-US" smtClean="0"/>
-              <a:t>2017/5/15</a:t>
+              <a:t>2017/6/10</a:t>
             </a:fld>
             <a:endParaRPr lang="zh-TW" altLang="en-US"/>
           </a:p>
@@ -1243,7 +1598,7 @@
           </a:lstStyle>
           <a:p>
             <a:r>
-              <a:rPr lang="zh-TW" altLang="en-US" smtClean="0"/>
+              <a:rPr lang="zh-TW" altLang="en-US"/>
               <a:t>按一下以編輯母片標題樣式</a:t>
             </a:r>
             <a:endParaRPr lang="en-US" dirty="0"/>
@@ -1364,7 +1719,7 @@
           <a:p>
             <a:pPr lvl="0"/>
             <a:r>
-              <a:rPr lang="zh-TW" altLang="en-US" smtClean="0"/>
+              <a:rPr lang="zh-TW" altLang="en-US"/>
               <a:t>按一下以編輯母片文字樣式</a:t>
             </a:r>
           </a:p>
@@ -1385,9 +1740,9 @@
           <a:bodyPr/>
           <a:lstStyle/>
           <a:p>
-            <a:fld id="{4E36EFF2-401A-4965-9693-89B521DD1865}" type="datetimeFigureOut">
+            <a:fld id="{83E2555D-1CAF-491C-93DF-122DC36A8BAE}" type="datetime1">
               <a:rPr lang="zh-TW" altLang="en-US" smtClean="0"/>
-              <a:t>2017/5/15</a:t>
+              <a:t>2017/6/10</a:t>
             </a:fld>
             <a:endParaRPr lang="zh-TW" altLang="en-US"/>
           </a:p>
@@ -1485,7 +1840,7 @@
           </a:lstStyle>
           <a:p>
             <a:r>
-              <a:rPr lang="zh-TW" altLang="en-US" smtClean="0"/>
+              <a:rPr lang="zh-TW" altLang="en-US"/>
               <a:t>按一下以編輯母片標題樣式</a:t>
             </a:r>
             <a:endParaRPr lang="en-US" dirty="0"/>
@@ -1560,7 +1915,7 @@
           <a:p>
             <a:pPr lvl="0"/>
             <a:r>
-              <a:rPr lang="zh-TW" altLang="en-US" smtClean="0"/>
+              <a:rPr lang="zh-TW" altLang="en-US"/>
               <a:t>按一下以編輯母片文字樣式</a:t>
             </a:r>
           </a:p>
@@ -1627,7 +1982,7 @@
           <a:p>
             <a:pPr lvl="0"/>
             <a:r>
-              <a:rPr lang="zh-TW" altLang="en-US" smtClean="0"/>
+              <a:rPr lang="zh-TW" altLang="en-US"/>
               <a:t>按一下以編輯母片文字樣式</a:t>
             </a:r>
           </a:p>
@@ -1701,7 +2056,7 @@
           <a:p>
             <a:pPr lvl="0"/>
             <a:r>
-              <a:rPr lang="zh-TW" altLang="en-US" smtClean="0"/>
+              <a:rPr lang="zh-TW" altLang="en-US"/>
               <a:t>按一下以編輯母片文字樣式</a:t>
             </a:r>
           </a:p>
@@ -1768,7 +2123,7 @@
           <a:p>
             <a:pPr lvl="0"/>
             <a:r>
-              <a:rPr lang="zh-TW" altLang="en-US" smtClean="0"/>
+              <a:rPr lang="zh-TW" altLang="en-US"/>
               <a:t>按一下以編輯母片文字樣式</a:t>
             </a:r>
           </a:p>
@@ -1842,7 +2197,7 @@
           <a:p>
             <a:pPr lvl="0"/>
             <a:r>
-              <a:rPr lang="zh-TW" altLang="en-US" smtClean="0"/>
+              <a:rPr lang="zh-TW" altLang="en-US"/>
               <a:t>按一下以編輯母片文字樣式</a:t>
             </a:r>
           </a:p>
@@ -1909,7 +2264,7 @@
           <a:p>
             <a:pPr lvl="0"/>
             <a:r>
-              <a:rPr lang="zh-TW" altLang="en-US" smtClean="0"/>
+              <a:rPr lang="zh-TW" altLang="en-US"/>
               <a:t>按一下以編輯母片文字樣式</a:t>
             </a:r>
           </a:p>
@@ -2008,9 +2363,9 @@
           <a:bodyPr/>
           <a:lstStyle/>
           <a:p>
-            <a:fld id="{4E36EFF2-401A-4965-9693-89B521DD1865}" type="datetimeFigureOut">
+            <a:fld id="{AD388C5D-934B-45F1-BEFA-AF18806351E4}" type="datetime1">
               <a:rPr lang="zh-TW" altLang="en-US" smtClean="0"/>
-              <a:t>2017/5/15</a:t>
+              <a:t>2017/6/10</a:t>
             </a:fld>
             <a:endParaRPr lang="zh-TW" altLang="en-US"/>
           </a:p>
@@ -2108,7 +2463,7 @@
           </a:lstStyle>
           <a:p>
             <a:r>
-              <a:rPr lang="zh-TW" altLang="en-US" smtClean="0"/>
+              <a:rPr lang="zh-TW" altLang="en-US"/>
               <a:t>按一下以編輯母片標題樣式</a:t>
             </a:r>
             <a:endParaRPr lang="en-US" dirty="0"/>
@@ -2183,7 +2538,7 @@
           <a:p>
             <a:pPr lvl="0"/>
             <a:r>
-              <a:rPr lang="zh-TW" altLang="en-US" smtClean="0"/>
+              <a:rPr lang="zh-TW" altLang="en-US"/>
               <a:t>按一下以編輯母片文字樣式</a:t>
             </a:r>
           </a:p>
@@ -2261,7 +2616,7 @@
           </a:lstStyle>
           <a:p>
             <a:r>
-              <a:rPr lang="zh-TW" altLang="en-US" smtClean="0"/>
+              <a:rPr lang="zh-TW" altLang="en-US"/>
               <a:t>按一下圖示以新增圖片</a:t>
             </a:r>
             <a:endParaRPr lang="en-US" dirty="0"/>
@@ -2329,7 +2684,7 @@
           <a:p>
             <a:pPr lvl="0"/>
             <a:r>
-              <a:rPr lang="zh-TW" altLang="en-US" smtClean="0"/>
+              <a:rPr lang="zh-TW" altLang="en-US"/>
               <a:t>按一下以編輯母片文字樣式</a:t>
             </a:r>
           </a:p>
@@ -2403,7 +2758,7 @@
           <a:p>
             <a:pPr lvl="0"/>
             <a:r>
-              <a:rPr lang="zh-TW" altLang="en-US" smtClean="0"/>
+              <a:rPr lang="zh-TW" altLang="en-US"/>
               <a:t>按一下以編輯母片文字樣式</a:t>
             </a:r>
           </a:p>
@@ -2481,7 +2836,7 @@
           </a:lstStyle>
           <a:p>
             <a:r>
-              <a:rPr lang="zh-TW" altLang="en-US" smtClean="0"/>
+              <a:rPr lang="zh-TW" altLang="en-US"/>
               <a:t>按一下圖示以新增圖片</a:t>
             </a:r>
             <a:endParaRPr lang="en-US" dirty="0"/>
@@ -2549,7 +2904,7 @@
           <a:p>
             <a:pPr lvl="0"/>
             <a:r>
-              <a:rPr lang="zh-TW" altLang="en-US" smtClean="0"/>
+              <a:rPr lang="zh-TW" altLang="en-US"/>
               <a:t>按一下以編輯母片文字樣式</a:t>
             </a:r>
           </a:p>
@@ -2623,7 +2978,7 @@
           <a:p>
             <a:pPr lvl="0"/>
             <a:r>
-              <a:rPr lang="zh-TW" altLang="en-US" smtClean="0"/>
+              <a:rPr lang="zh-TW" altLang="en-US"/>
               <a:t>按一下以編輯母片文字樣式</a:t>
             </a:r>
           </a:p>
@@ -2701,7 +3056,7 @@
           </a:lstStyle>
           <a:p>
             <a:r>
-              <a:rPr lang="zh-TW" altLang="en-US" smtClean="0"/>
+              <a:rPr lang="zh-TW" altLang="en-US"/>
               <a:t>按一下圖示以新增圖片</a:t>
             </a:r>
             <a:endParaRPr lang="en-US" dirty="0"/>
@@ -2769,7 +3124,7 @@
           <a:p>
             <a:pPr lvl="0"/>
             <a:r>
-              <a:rPr lang="zh-TW" altLang="en-US" smtClean="0"/>
+              <a:rPr lang="zh-TW" altLang="en-US"/>
               <a:t>按一下以編輯母片文字樣式</a:t>
             </a:r>
           </a:p>
@@ -2868,9 +3223,9 @@
           <a:bodyPr/>
           <a:lstStyle/>
           <a:p>
-            <a:fld id="{4E36EFF2-401A-4965-9693-89B521DD1865}" type="datetimeFigureOut">
+            <a:fld id="{602D037C-BD92-4945-9D2B-B4DB81AA05D1}" type="datetime1">
               <a:rPr lang="zh-TW" altLang="en-US" smtClean="0"/>
-              <a:t>2017/5/15</a:t>
+              <a:t>2017/6/10</a:t>
             </a:fld>
             <a:endParaRPr lang="zh-TW" altLang="en-US"/>
           </a:p>
@@ -2964,7 +3319,7 @@
           <a:lstStyle/>
           <a:p>
             <a:r>
-              <a:rPr lang="zh-TW" altLang="en-US" smtClean="0"/>
+              <a:rPr lang="zh-TW" altLang="en-US"/>
               <a:t>按一下以編輯母片標題樣式</a:t>
             </a:r>
             <a:endParaRPr lang="en-US" dirty="0"/>
@@ -2988,35 +3343,35 @@
           <a:p>
             <a:pPr lvl="0"/>
             <a:r>
-              <a:rPr lang="zh-TW" altLang="en-US" smtClean="0"/>
+              <a:rPr lang="zh-TW" altLang="en-US"/>
               <a:t>按一下以編輯母片文字樣式</a:t>
             </a:r>
           </a:p>
           <a:p>
             <a:pPr lvl="1"/>
             <a:r>
-              <a:rPr lang="zh-TW" altLang="en-US" smtClean="0"/>
+              <a:rPr lang="zh-TW" altLang="en-US"/>
               <a:t>第二層</a:t>
             </a:r>
           </a:p>
           <a:p>
             <a:pPr lvl="2"/>
             <a:r>
-              <a:rPr lang="zh-TW" altLang="en-US" smtClean="0"/>
+              <a:rPr lang="zh-TW" altLang="en-US"/>
               <a:t>第三層</a:t>
             </a:r>
           </a:p>
           <a:p>
             <a:pPr lvl="3"/>
             <a:r>
-              <a:rPr lang="zh-TW" altLang="en-US" smtClean="0"/>
+              <a:rPr lang="zh-TW" altLang="en-US"/>
               <a:t>第四層</a:t>
             </a:r>
           </a:p>
           <a:p>
             <a:pPr lvl="4"/>
             <a:r>
-              <a:rPr lang="zh-TW" altLang="en-US" smtClean="0"/>
+              <a:rPr lang="zh-TW" altLang="en-US"/>
               <a:t>第五層</a:t>
             </a:r>
             <a:endParaRPr lang="en-US" dirty="0"/>
@@ -3038,9 +3393,9 @@
           <a:bodyPr/>
           <a:lstStyle/>
           <a:p>
-            <a:fld id="{4E36EFF2-401A-4965-9693-89B521DD1865}" type="datetimeFigureOut">
+            <a:fld id="{B65005D3-BAB5-4ECE-9C45-5DF61A480FFB}" type="datetime1">
               <a:rPr lang="zh-TW" altLang="en-US" smtClean="0"/>
-              <a:t>2017/5/15</a:t>
+              <a:t>2017/6/10</a:t>
             </a:fld>
             <a:endParaRPr lang="zh-TW" altLang="en-US"/>
           </a:p>
@@ -3139,7 +3494,7 @@
           <a:lstStyle/>
           <a:p>
             <a:r>
-              <a:rPr lang="zh-TW" altLang="en-US" smtClean="0"/>
+              <a:rPr lang="zh-TW" altLang="en-US"/>
               <a:t>按一下以編輯母片標題樣式</a:t>
             </a:r>
             <a:endParaRPr lang="en-US" dirty="0"/>
@@ -3168,35 +3523,35 @@
           <a:p>
             <a:pPr lvl="0"/>
             <a:r>
-              <a:rPr lang="zh-TW" altLang="en-US" smtClean="0"/>
+              <a:rPr lang="zh-TW" altLang="en-US"/>
               <a:t>按一下以編輯母片文字樣式</a:t>
             </a:r>
           </a:p>
           <a:p>
             <a:pPr lvl="1"/>
             <a:r>
-              <a:rPr lang="zh-TW" altLang="en-US" smtClean="0"/>
+              <a:rPr lang="zh-TW" altLang="en-US"/>
               <a:t>第二層</a:t>
             </a:r>
           </a:p>
           <a:p>
             <a:pPr lvl="2"/>
             <a:r>
-              <a:rPr lang="zh-TW" altLang="en-US" smtClean="0"/>
+              <a:rPr lang="zh-TW" altLang="en-US"/>
               <a:t>第三層</a:t>
             </a:r>
           </a:p>
           <a:p>
             <a:pPr lvl="3"/>
             <a:r>
-              <a:rPr lang="zh-TW" altLang="en-US" smtClean="0"/>
+              <a:rPr lang="zh-TW" altLang="en-US"/>
               <a:t>第四層</a:t>
             </a:r>
           </a:p>
           <a:p>
             <a:pPr lvl="4"/>
             <a:r>
-              <a:rPr lang="zh-TW" altLang="en-US" smtClean="0"/>
+              <a:rPr lang="zh-TW" altLang="en-US"/>
               <a:t>第五層</a:t>
             </a:r>
             <a:endParaRPr lang="en-US" dirty="0"/>
@@ -3218,9 +3573,9 @@
           <a:bodyPr/>
           <a:lstStyle/>
           <a:p>
-            <a:fld id="{4E36EFF2-401A-4965-9693-89B521DD1865}" type="datetimeFigureOut">
+            <a:fld id="{30457D24-CF1D-4943-8A79-3769A31C62D1}" type="datetime1">
               <a:rPr lang="zh-TW" altLang="en-US" smtClean="0"/>
-              <a:t>2017/5/15</a:t>
+              <a:t>2017/6/10</a:t>
             </a:fld>
             <a:endParaRPr lang="zh-TW" altLang="en-US"/>
           </a:p>
@@ -3314,7 +3669,7 @@
           <a:lstStyle/>
           <a:p>
             <a:r>
-              <a:rPr lang="zh-TW" altLang="en-US" smtClean="0"/>
+              <a:rPr lang="zh-TW" altLang="en-US"/>
               <a:t>按一下以編輯母片標題樣式</a:t>
             </a:r>
             <a:endParaRPr lang="en-US" dirty="0"/>
@@ -3338,35 +3693,35 @@
           <a:p>
             <a:pPr lvl="0"/>
             <a:r>
-              <a:rPr lang="zh-TW" altLang="en-US" smtClean="0"/>
+              <a:rPr lang="zh-TW" altLang="en-US"/>
               <a:t>按一下以編輯母片文字樣式</a:t>
             </a:r>
           </a:p>
           <a:p>
             <a:pPr lvl="1"/>
             <a:r>
-              <a:rPr lang="zh-TW" altLang="en-US" smtClean="0"/>
+              <a:rPr lang="zh-TW" altLang="en-US"/>
               <a:t>第二層</a:t>
             </a:r>
           </a:p>
           <a:p>
             <a:pPr lvl="2"/>
             <a:r>
-              <a:rPr lang="zh-TW" altLang="en-US" smtClean="0"/>
+              <a:rPr lang="zh-TW" altLang="en-US"/>
               <a:t>第三層</a:t>
             </a:r>
           </a:p>
           <a:p>
             <a:pPr lvl="3"/>
             <a:r>
-              <a:rPr lang="zh-TW" altLang="en-US" smtClean="0"/>
+              <a:rPr lang="zh-TW" altLang="en-US"/>
               <a:t>第四層</a:t>
             </a:r>
           </a:p>
           <a:p>
             <a:pPr lvl="4"/>
             <a:r>
-              <a:rPr lang="zh-TW" altLang="en-US" smtClean="0"/>
+              <a:rPr lang="zh-TW" altLang="en-US"/>
               <a:t>第五層</a:t>
             </a:r>
             <a:endParaRPr lang="en-US" dirty="0"/>
@@ -3388,9 +3743,9 @@
           <a:bodyPr/>
           <a:lstStyle/>
           <a:p>
-            <a:fld id="{4E36EFF2-401A-4965-9693-89B521DD1865}" type="datetimeFigureOut">
+            <a:fld id="{9B4A1876-3714-4D19-BCDA-11783C451A09}" type="datetime1">
               <a:rPr lang="zh-TW" altLang="en-US" smtClean="0"/>
-              <a:t>2017/5/15</a:t>
+              <a:t>2017/6/10</a:t>
             </a:fld>
             <a:endParaRPr lang="zh-TW" altLang="en-US"/>
           </a:p>
@@ -3493,7 +3848,7 @@
           </a:lstStyle>
           <a:p>
             <a:r>
-              <a:rPr lang="zh-TW" altLang="en-US" smtClean="0"/>
+              <a:rPr lang="zh-TW" altLang="en-US"/>
               <a:t>按一下以編輯母片標題樣式</a:t>
             </a:r>
             <a:endParaRPr lang="en-US" dirty="0"/>
@@ -3614,7 +3969,7 @@
           <a:p>
             <a:pPr lvl="0"/>
             <a:r>
-              <a:rPr lang="zh-TW" altLang="en-US" smtClean="0"/>
+              <a:rPr lang="zh-TW" altLang="en-US"/>
               <a:t>按一下以編輯母片文字樣式</a:t>
             </a:r>
           </a:p>
@@ -3635,9 +3990,9 @@
           <a:bodyPr/>
           <a:lstStyle/>
           <a:p>
-            <a:fld id="{4E36EFF2-401A-4965-9693-89B521DD1865}" type="datetimeFigureOut">
+            <a:fld id="{A3150251-5E54-4475-A826-FCCE4A2CA754}" type="datetime1">
               <a:rPr lang="zh-TW" altLang="en-US" smtClean="0"/>
-              <a:t>2017/5/15</a:t>
+              <a:t>2017/6/10</a:t>
             </a:fld>
             <a:endParaRPr lang="zh-TW" altLang="en-US"/>
           </a:p>
@@ -3731,7 +4086,7 @@
           <a:lstStyle/>
           <a:p>
             <a:r>
-              <a:rPr lang="zh-TW" altLang="en-US" smtClean="0"/>
+              <a:rPr lang="zh-TW" altLang="en-US"/>
               <a:t>按一下以編輯母片標題樣式</a:t>
             </a:r>
             <a:endParaRPr lang="en-US" dirty="0"/>
@@ -3790,35 +4145,35 @@
           <a:p>
             <a:pPr lvl="0"/>
             <a:r>
-              <a:rPr lang="zh-TW" altLang="en-US" smtClean="0"/>
+              <a:rPr lang="zh-TW" altLang="en-US"/>
               <a:t>按一下以編輯母片文字樣式</a:t>
             </a:r>
           </a:p>
           <a:p>
             <a:pPr lvl="1"/>
             <a:r>
-              <a:rPr lang="zh-TW" altLang="en-US" smtClean="0"/>
+              <a:rPr lang="zh-TW" altLang="en-US"/>
               <a:t>第二層</a:t>
             </a:r>
           </a:p>
           <a:p>
             <a:pPr lvl="2"/>
             <a:r>
-              <a:rPr lang="zh-TW" altLang="en-US" smtClean="0"/>
+              <a:rPr lang="zh-TW" altLang="en-US"/>
               <a:t>第三層</a:t>
             </a:r>
           </a:p>
           <a:p>
             <a:pPr lvl="3"/>
             <a:r>
-              <a:rPr lang="zh-TW" altLang="en-US" smtClean="0"/>
+              <a:rPr lang="zh-TW" altLang="en-US"/>
               <a:t>第四層</a:t>
             </a:r>
           </a:p>
           <a:p>
             <a:pPr lvl="4"/>
             <a:r>
-              <a:rPr lang="zh-TW" altLang="en-US" smtClean="0"/>
+              <a:rPr lang="zh-TW" altLang="en-US"/>
               <a:t>第五層</a:t>
             </a:r>
             <a:endParaRPr lang="en-US" dirty="0"/>
@@ -3877,35 +4232,35 @@
           <a:p>
             <a:pPr lvl="0"/>
             <a:r>
-              <a:rPr lang="zh-TW" altLang="en-US" smtClean="0"/>
+              <a:rPr lang="zh-TW" altLang="en-US"/>
               <a:t>按一下以編輯母片文字樣式</a:t>
             </a:r>
           </a:p>
           <a:p>
             <a:pPr lvl="1"/>
             <a:r>
-              <a:rPr lang="zh-TW" altLang="en-US" smtClean="0"/>
+              <a:rPr lang="zh-TW" altLang="en-US"/>
               <a:t>第二層</a:t>
             </a:r>
           </a:p>
           <a:p>
             <a:pPr lvl="2"/>
             <a:r>
-              <a:rPr lang="zh-TW" altLang="en-US" smtClean="0"/>
+              <a:rPr lang="zh-TW" altLang="en-US"/>
               <a:t>第三層</a:t>
             </a:r>
           </a:p>
           <a:p>
             <a:pPr lvl="3"/>
             <a:r>
-              <a:rPr lang="zh-TW" altLang="en-US" smtClean="0"/>
+              <a:rPr lang="zh-TW" altLang="en-US"/>
               <a:t>第四層</a:t>
             </a:r>
           </a:p>
           <a:p>
             <a:pPr lvl="4"/>
             <a:r>
-              <a:rPr lang="zh-TW" altLang="en-US" smtClean="0"/>
+              <a:rPr lang="zh-TW" altLang="en-US"/>
               <a:t>第五層</a:t>
             </a:r>
             <a:endParaRPr lang="en-US" dirty="0"/>
@@ -3927,9 +4282,9 @@
           <a:bodyPr/>
           <a:lstStyle/>
           <a:p>
-            <a:fld id="{4E36EFF2-401A-4965-9693-89B521DD1865}" type="datetimeFigureOut">
+            <a:fld id="{7E035F79-CEB0-493B-8ACC-DE371E004C47}" type="datetime1">
               <a:rPr lang="zh-TW" altLang="en-US" smtClean="0"/>
-              <a:t>2017/5/15</a:t>
+              <a:t>2017/6/10</a:t>
             </a:fld>
             <a:endParaRPr lang="zh-TW" altLang="en-US"/>
           </a:p>
@@ -4027,7 +4382,7 @@
           </a:lstStyle>
           <a:p>
             <a:r>
-              <a:rPr lang="zh-TW" altLang="en-US" smtClean="0"/>
+              <a:rPr lang="zh-TW" altLang="en-US"/>
               <a:t>按一下以編輯母片標題樣式</a:t>
             </a:r>
             <a:endParaRPr lang="en-US" dirty="0"/>
@@ -4102,7 +4457,7 @@
           <a:p>
             <a:pPr lvl="0"/>
             <a:r>
-              <a:rPr lang="zh-TW" altLang="en-US" smtClean="0"/>
+              <a:rPr lang="zh-TW" altLang="en-US"/>
               <a:t>按一下以編輯母片文字樣式</a:t>
             </a:r>
           </a:p>
@@ -4160,35 +4515,35 @@
           <a:p>
             <a:pPr lvl="0"/>
             <a:r>
-              <a:rPr lang="zh-TW" altLang="en-US" smtClean="0"/>
+              <a:rPr lang="zh-TW" altLang="en-US"/>
               <a:t>按一下以編輯母片文字樣式</a:t>
             </a:r>
           </a:p>
           <a:p>
             <a:pPr lvl="1"/>
             <a:r>
-              <a:rPr lang="zh-TW" altLang="en-US" smtClean="0"/>
+              <a:rPr lang="zh-TW" altLang="en-US"/>
               <a:t>第二層</a:t>
             </a:r>
           </a:p>
           <a:p>
             <a:pPr lvl="2"/>
             <a:r>
-              <a:rPr lang="zh-TW" altLang="en-US" smtClean="0"/>
+              <a:rPr lang="zh-TW" altLang="en-US"/>
               <a:t>第三層</a:t>
             </a:r>
           </a:p>
           <a:p>
             <a:pPr lvl="3"/>
             <a:r>
-              <a:rPr lang="zh-TW" altLang="en-US" smtClean="0"/>
+              <a:rPr lang="zh-TW" altLang="en-US"/>
               <a:t>第四層</a:t>
             </a:r>
           </a:p>
           <a:p>
             <a:pPr lvl="4"/>
             <a:r>
-              <a:rPr lang="zh-TW" altLang="en-US" smtClean="0"/>
+              <a:rPr lang="zh-TW" altLang="en-US"/>
               <a:t>第五層</a:t>
             </a:r>
             <a:endParaRPr lang="en-US" dirty="0"/>
@@ -4263,7 +4618,7 @@
           <a:p>
             <a:pPr lvl="0"/>
             <a:r>
-              <a:rPr lang="zh-TW" altLang="en-US" smtClean="0"/>
+              <a:rPr lang="zh-TW" altLang="en-US"/>
               <a:t>按一下以編輯母片文字樣式</a:t>
             </a:r>
           </a:p>
@@ -4321,35 +4676,35 @@
           <a:p>
             <a:pPr lvl="0"/>
             <a:r>
-              <a:rPr lang="zh-TW" altLang="en-US" smtClean="0"/>
+              <a:rPr lang="zh-TW" altLang="en-US"/>
               <a:t>按一下以編輯母片文字樣式</a:t>
             </a:r>
           </a:p>
           <a:p>
             <a:pPr lvl="1"/>
             <a:r>
-              <a:rPr lang="zh-TW" altLang="en-US" smtClean="0"/>
+              <a:rPr lang="zh-TW" altLang="en-US"/>
               <a:t>第二層</a:t>
             </a:r>
           </a:p>
           <a:p>
             <a:pPr lvl="2"/>
             <a:r>
-              <a:rPr lang="zh-TW" altLang="en-US" smtClean="0"/>
+              <a:rPr lang="zh-TW" altLang="en-US"/>
               <a:t>第三層</a:t>
             </a:r>
           </a:p>
           <a:p>
             <a:pPr lvl="3"/>
             <a:r>
-              <a:rPr lang="zh-TW" altLang="en-US" smtClean="0"/>
+              <a:rPr lang="zh-TW" altLang="en-US"/>
               <a:t>第四層</a:t>
             </a:r>
           </a:p>
           <a:p>
             <a:pPr lvl="4"/>
             <a:r>
-              <a:rPr lang="zh-TW" altLang="en-US" smtClean="0"/>
+              <a:rPr lang="zh-TW" altLang="en-US"/>
               <a:t>第五層</a:t>
             </a:r>
             <a:endParaRPr lang="en-US" dirty="0"/>
@@ -4371,9 +4726,9 @@
           <a:bodyPr/>
           <a:lstStyle/>
           <a:p>
-            <a:fld id="{4E36EFF2-401A-4965-9693-89B521DD1865}" type="datetimeFigureOut">
+            <a:fld id="{871F7979-DACB-4F46-A808-A4B6A96016CC}" type="datetime1">
               <a:rPr lang="zh-TW" altLang="en-US" smtClean="0"/>
-              <a:t>2017/5/15</a:t>
+              <a:t>2017/6/10</a:t>
             </a:fld>
             <a:endParaRPr lang="zh-TW" altLang="en-US"/>
           </a:p>
@@ -4467,7 +4822,7 @@
           <a:lstStyle/>
           <a:p>
             <a:r>
-              <a:rPr lang="zh-TW" altLang="en-US" smtClean="0"/>
+              <a:rPr lang="zh-TW" altLang="en-US"/>
               <a:t>按一下以編輯母片標題樣式</a:t>
             </a:r>
             <a:endParaRPr lang="en-US" dirty="0"/>
@@ -4489,9 +4844,9 @@
           <a:bodyPr/>
           <a:lstStyle/>
           <a:p>
-            <a:fld id="{4E36EFF2-401A-4965-9693-89B521DD1865}" type="datetimeFigureOut">
+            <a:fld id="{18A074A1-D848-4AF5-B1D3-0AA759C32111}" type="datetime1">
               <a:rPr lang="zh-TW" altLang="en-US" smtClean="0"/>
-              <a:t>2017/5/15</a:t>
+              <a:t>2017/6/10</a:t>
             </a:fld>
             <a:endParaRPr lang="zh-TW" altLang="en-US"/>
           </a:p>
@@ -4584,9 +4939,9 @@
           <a:bodyPr/>
           <a:lstStyle/>
           <a:p>
-            <a:fld id="{4E36EFF2-401A-4965-9693-89B521DD1865}" type="datetimeFigureOut">
+            <a:fld id="{21A29BCF-1345-4F31-9384-1BCB1E907DFC}" type="datetime1">
               <a:rPr lang="zh-TW" altLang="en-US" smtClean="0"/>
-              <a:t>2017/5/15</a:t>
+              <a:t>2017/6/10</a:t>
             </a:fld>
             <a:endParaRPr lang="zh-TW" altLang="en-US"/>
           </a:p>
@@ -4689,7 +5044,7 @@
           </a:lstStyle>
           <a:p>
             <a:r>
-              <a:rPr lang="zh-TW" altLang="en-US" smtClean="0"/>
+              <a:rPr lang="zh-TW" altLang="en-US"/>
               <a:t>按一下以編輯母片標題樣式</a:t>
             </a:r>
             <a:endParaRPr lang="en-US" dirty="0"/>
@@ -4748,35 +5103,35 @@
           <a:p>
             <a:pPr lvl="0"/>
             <a:r>
-              <a:rPr lang="zh-TW" altLang="en-US" smtClean="0"/>
+              <a:rPr lang="zh-TW" altLang="en-US"/>
               <a:t>按一下以編輯母片文字樣式</a:t>
             </a:r>
           </a:p>
           <a:p>
             <a:pPr lvl="1"/>
             <a:r>
-              <a:rPr lang="zh-TW" altLang="en-US" smtClean="0"/>
+              <a:rPr lang="zh-TW" altLang="en-US"/>
               <a:t>第二層</a:t>
             </a:r>
           </a:p>
           <a:p>
             <a:pPr lvl="2"/>
             <a:r>
-              <a:rPr lang="zh-TW" altLang="en-US" smtClean="0"/>
+              <a:rPr lang="zh-TW" altLang="en-US"/>
               <a:t>第三層</a:t>
             </a:r>
           </a:p>
           <a:p>
             <a:pPr lvl="3"/>
             <a:r>
-              <a:rPr lang="zh-TW" altLang="en-US" smtClean="0"/>
+              <a:rPr lang="zh-TW" altLang="en-US"/>
               <a:t>第四層</a:t>
             </a:r>
           </a:p>
           <a:p>
             <a:pPr lvl="4"/>
             <a:r>
-              <a:rPr lang="zh-TW" altLang="en-US" smtClean="0"/>
+              <a:rPr lang="zh-TW" altLang="en-US"/>
               <a:t>第五層</a:t>
             </a:r>
             <a:endParaRPr lang="en-US" dirty="0"/>
@@ -4842,7 +5197,7 @@
           <a:p>
             <a:pPr lvl="0"/>
             <a:r>
-              <a:rPr lang="zh-TW" altLang="en-US" smtClean="0"/>
+              <a:rPr lang="zh-TW" altLang="en-US"/>
               <a:t>按一下以編輯母片文字樣式</a:t>
             </a:r>
           </a:p>
@@ -4863,9 +5218,9 @@
           <a:bodyPr/>
           <a:lstStyle/>
           <a:p>
-            <a:fld id="{4E36EFF2-401A-4965-9693-89B521DD1865}" type="datetimeFigureOut">
+            <a:fld id="{4BFD130F-3FC0-4250-A6C3-ED1DB289277E}" type="datetime1">
               <a:rPr lang="zh-TW" altLang="en-US" smtClean="0"/>
-              <a:t>2017/5/15</a:t>
+              <a:t>2017/6/10</a:t>
             </a:fld>
             <a:endParaRPr lang="zh-TW" altLang="en-US"/>
           </a:p>
@@ -4970,7 +5325,7 @@
           </a:lstStyle>
           <a:p>
             <a:r>
-              <a:rPr lang="zh-TW" altLang="en-US" smtClean="0"/>
+              <a:rPr lang="zh-TW" altLang="en-US"/>
               <a:t>按一下以編輯母片標題樣式</a:t>
             </a:r>
             <a:endParaRPr lang="en-US" dirty="0"/>
@@ -5049,7 +5404,7 @@
           </a:lstStyle>
           <a:p>
             <a:r>
-              <a:rPr lang="zh-TW" altLang="en-US" smtClean="0"/>
+              <a:rPr lang="zh-TW" altLang="en-US"/>
               <a:t>按一下圖示以新增圖片</a:t>
             </a:r>
             <a:endParaRPr lang="en-US" dirty="0"/>
@@ -5117,7 +5472,7 @@
           <a:p>
             <a:pPr lvl="0"/>
             <a:r>
-              <a:rPr lang="zh-TW" altLang="en-US" smtClean="0"/>
+              <a:rPr lang="zh-TW" altLang="en-US"/>
               <a:t>按一下以編輯母片文字樣式</a:t>
             </a:r>
           </a:p>
@@ -5138,9 +5493,9 @@
           <a:bodyPr/>
           <a:lstStyle/>
           <a:p>
-            <a:fld id="{4E36EFF2-401A-4965-9693-89B521DD1865}" type="datetimeFigureOut">
+            <a:fld id="{5ED0876A-E339-42ED-91DF-4C85490F9FB7}" type="datetime1">
               <a:rPr lang="zh-TW" altLang="en-US" smtClean="0"/>
-              <a:t>2017/5/15</a:t>
+              <a:t>2017/6/10</a:t>
             </a:fld>
             <a:endParaRPr lang="zh-TW" altLang="en-US"/>
           </a:p>
@@ -5464,7 +5819,7 @@
           <a:lstStyle/>
           <a:p>
             <a:r>
-              <a:rPr lang="zh-TW" altLang="en-US" smtClean="0"/>
+              <a:rPr lang="zh-TW" altLang="en-US"/>
               <a:t>按一下以編輯母片標題樣式</a:t>
             </a:r>
             <a:endParaRPr lang="en-US" dirty="0"/>
@@ -5498,35 +5853,35 @@
           <a:p>
             <a:pPr lvl="0"/>
             <a:r>
-              <a:rPr lang="zh-TW" altLang="en-US" smtClean="0"/>
+              <a:rPr lang="zh-TW" altLang="en-US"/>
               <a:t>按一下以編輯母片文字樣式</a:t>
             </a:r>
           </a:p>
           <a:p>
             <a:pPr lvl="1"/>
             <a:r>
-              <a:rPr lang="zh-TW" altLang="en-US" smtClean="0"/>
+              <a:rPr lang="zh-TW" altLang="en-US"/>
               <a:t>第二層</a:t>
             </a:r>
           </a:p>
           <a:p>
             <a:pPr lvl="2"/>
             <a:r>
-              <a:rPr lang="zh-TW" altLang="en-US" smtClean="0"/>
+              <a:rPr lang="zh-TW" altLang="en-US"/>
               <a:t>第三層</a:t>
             </a:r>
           </a:p>
           <a:p>
             <a:pPr lvl="3"/>
             <a:r>
-              <a:rPr lang="zh-TW" altLang="en-US" smtClean="0"/>
+              <a:rPr lang="zh-TW" altLang="en-US"/>
               <a:t>第四層</a:t>
             </a:r>
           </a:p>
           <a:p>
             <a:pPr lvl="4"/>
             <a:r>
-              <a:rPr lang="zh-TW" altLang="en-US" smtClean="0"/>
+              <a:rPr lang="zh-TW" altLang="en-US"/>
               <a:t>第五層</a:t>
             </a:r>
             <a:endParaRPr lang="en-US" dirty="0"/>
@@ -5567,9 +5922,9 @@
             </a:lvl1pPr>
           </a:lstStyle>
           <a:p>
-            <a:fld id="{4E36EFF2-401A-4965-9693-89B521DD1865}" type="datetimeFigureOut">
+            <a:fld id="{92C86D49-289C-4183-94F2-E03C2F82975B}" type="datetime1">
               <a:rPr lang="zh-TW" altLang="en-US" smtClean="0"/>
-              <a:t>2017/5/15</a:t>
+              <a:t>2017/6/10</a:t>
             </a:fld>
             <a:endParaRPr lang="zh-TW" altLang="en-US"/>
           </a:p>
@@ -5681,6 +6036,7 @@
     <p:sldLayoutId id="2147483736" r:id="rId16"/>
     <p:sldLayoutId id="2147483737" r:id="rId17"/>
   </p:sldLayoutIdLst>
+  <p:hf hdr="0" ftr="0" dt="0"/>
   <p:txStyles>
     <p:titleStyle>
       <a:lvl1pPr algn="l" defTabSz="457200" rtl="0" eaLnBrk="1" latinLnBrk="0" hangingPunct="1">
@@ -6109,7 +6465,7 @@
         </p:nvSpPr>
         <p:spPr>
           <a:xfrm>
-            <a:off x="300937" y="1794293"/>
+            <a:off x="295450" y="1803530"/>
             <a:ext cx="11813423" cy="1464837"/>
           </a:xfrm>
         </p:spPr>
@@ -6118,18 +6474,9 @@
           <a:lstStyle/>
           <a:p>
             <a:r>
-              <a:rPr lang="en-US" altLang="zh-TW" sz="5700" b="1" dirty="0" smtClean="0"/>
-              <a:t>How easily </a:t>
-            </a:r>
-            <a:r>
-              <a:rPr lang="en-US" altLang="zh-TW" sz="5700" b="1" smtClean="0"/>
-              <a:t>to make a </a:t>
-            </a:r>
-            <a:r>
-              <a:rPr lang="en-US" altLang="zh-TW" sz="5700" b="1" dirty="0" smtClean="0"/>
-              <a:t>POP song?</a:t>
-            </a:r>
-            <a:endParaRPr lang="en-US" altLang="zh-TW" sz="5700" b="1" dirty="0"/>
+              <a:rPr lang="en-US" altLang="zh-TW" sz="5700" b="1" dirty="0"/>
+              <a:t>How easy to create a POP song?</a:t>
+            </a:r>
           </a:p>
         </p:txBody>
       </p:sp>
@@ -6154,16 +6501,41 @@
           <a:lstStyle/>
           <a:p>
             <a:r>
-              <a:rPr lang="en-US" altLang="zh-TW" dirty="0" smtClean="0"/>
-              <a:t>Speaker</a:t>
-            </a:r>
-            <a:r>
-              <a:rPr lang="en-US" altLang="zh-TW" smtClean="0"/>
-              <a:t>: </a:t>
-            </a:r>
-            <a:r>
-              <a:rPr lang="en-US" altLang="zh-TW" smtClean="0"/>
-              <a:t> Johnny</a:t>
+              <a:rPr lang="en-US" altLang="zh-TW" dirty="0"/>
+              <a:t>Speaker:  Johnny</a:t>
+            </a:r>
+            <a:endParaRPr lang="zh-TW" altLang="en-US" dirty="0"/>
+          </a:p>
+        </p:txBody>
+      </p:sp>
+      <p:sp>
+        <p:nvSpPr>
+          <p:cNvPr id="4" name="投影片編號版面配置區 3">
+            <a:extLst>
+              <a:ext uri="{FF2B5EF4-FFF2-40B4-BE49-F238E27FC236}">
+                <a16:creationId xmlns:a16="http://schemas.microsoft.com/office/drawing/2014/main" id="{080731D5-6FD5-4EE8-9ED1-F3B7192A0EFF}"/>
+              </a:ext>
+            </a:extLst>
+          </p:cNvPr>
+          <p:cNvSpPr>
+            <a:spLocks noGrp="1"/>
+          </p:cNvSpPr>
+          <p:nvPr>
+            <p:ph type="sldNum" sz="quarter" idx="12"/>
+          </p:nvPr>
+        </p:nvSpPr>
+        <p:spPr/>
+        <p:txBody>
+          <a:bodyPr/>
+          <a:lstStyle/>
+          <a:p>
+            <a:fld id="{185D6EED-6655-410A-86B1-950460054D05}" type="slidenum">
+              <a:rPr lang="zh-TW" altLang="en-US" smtClean="0"/>
+              <a:t>1</a:t>
+            </a:fld>
+            <a:r>
+              <a:rPr lang="en-US" altLang="zh-TW" dirty="0"/>
+              <a:t>/7</a:t>
             </a:r>
             <a:endParaRPr lang="zh-TW" altLang="en-US" dirty="0"/>
           </a:p>
@@ -6191,13 +6563,6 @@
       </p:transition>
     </mc:Fallback>
   </mc:AlternateContent>
-  <p:timing>
-    <p:tnLst>
-      <p:par>
-        <p:cTn id="1" dur="indefinite" restart="never" nodeType="tmRoot"/>
-      </p:par>
-    </p:tnLst>
-  </p:timing>
 </p:sld>
 </file>
 
@@ -6234,7 +6599,7 @@
           <a:lstStyle/>
           <a:p>
             <a:r>
-              <a:rPr lang="en-US" altLang="zh-TW" dirty="0" smtClean="0"/>
+              <a:rPr lang="en-US" altLang="zh-TW" dirty="0"/>
               <a:t>Easy POP Chorus Progression</a:t>
             </a:r>
             <a:endParaRPr lang="zh-TW" altLang="en-US" dirty="0"/>
@@ -6262,7 +6627,7 @@
           <a:lstStyle/>
           <a:p>
             <a:r>
-              <a:rPr lang="en-US" altLang="zh-TW" dirty="0" smtClean="0"/>
+              <a:rPr lang="en-US" altLang="zh-TW" dirty="0"/>
               <a:t>Basis of chorus</a:t>
             </a:r>
             <a:endParaRPr lang="zh-TW" altLang="en-US" dirty="0"/>
@@ -6290,7 +6655,7 @@
           <a:lstStyle/>
           <a:p>
             <a:r>
-              <a:rPr lang="en-US" altLang="zh-TW" dirty="0" smtClean="0"/>
+              <a:rPr lang="en-US" altLang="zh-TW" dirty="0"/>
               <a:t>Chorus on piano</a:t>
             </a:r>
             <a:endParaRPr lang="zh-TW" altLang="en-US" dirty="0"/>
@@ -6405,7 +6770,7 @@
           <a:lstStyle/>
           <a:p>
             <a:r>
-              <a:rPr lang="en-US" altLang="zh-TW" sz="2500" b="1" dirty="0" smtClean="0">
+              <a:rPr lang="en-US" altLang="zh-TW" sz="2500" b="1" dirty="0">
                 <a:ln w="10160">
                   <a:solidFill>
                     <a:schemeClr val="accent5"/>
@@ -6426,7 +6791,7 @@
               <a:t>Usually </a:t>
             </a:r>
             <a:r>
-              <a:rPr lang="en-US" altLang="zh-TW" sz="2500" b="1" dirty="0" smtClean="0">
+              <a:rPr lang="en-US" altLang="zh-TW" sz="2500" b="1" dirty="0">
                 <a:ln w="10160">
                   <a:solidFill>
                     <a:schemeClr val="accent5"/>
@@ -6447,7 +6812,7 @@
               <a:t>F –&gt; G –&gt; </a:t>
             </a:r>
             <a:r>
-              <a:rPr lang="en-US" altLang="zh-TW" sz="2500" b="1" dirty="0" err="1" smtClean="0">
+              <a:rPr lang="en-US" altLang="zh-TW" sz="2500" b="1" dirty="0" err="1">
                 <a:ln w="10160">
                   <a:solidFill>
                     <a:schemeClr val="accent5"/>
@@ -6468,7 +6833,7 @@
               <a:t>Em</a:t>
             </a:r>
             <a:r>
-              <a:rPr lang="en-US" altLang="zh-TW" sz="2500" b="1" dirty="0" smtClean="0">
+              <a:rPr lang="en-US" altLang="zh-TW" sz="2500" b="1" dirty="0">
                 <a:ln w="10160">
                   <a:solidFill>
                     <a:schemeClr val="accent5"/>
@@ -6489,7 +6854,7 @@
               <a:t> -&gt; Am </a:t>
             </a:r>
             <a:r>
-              <a:rPr lang="en-US" altLang="zh-TW" sz="2500" b="1" dirty="0" smtClean="0">
+              <a:rPr lang="en-US" altLang="zh-TW" sz="2500" b="1" dirty="0">
                 <a:ln w="10160">
                   <a:solidFill>
                     <a:schemeClr val="accent5"/>
@@ -6530,6 +6895,39 @@
           </a:p>
         </p:txBody>
       </p:sp>
+      <p:sp>
+        <p:nvSpPr>
+          <p:cNvPr id="4" name="投影片編號版面配置區 3">
+            <a:extLst>
+              <a:ext uri="{FF2B5EF4-FFF2-40B4-BE49-F238E27FC236}">
+                <a16:creationId xmlns:a16="http://schemas.microsoft.com/office/drawing/2014/main" id="{D69CBBB7-E6B6-4C56-96B1-E3F4B0E4EA29}"/>
+              </a:ext>
+            </a:extLst>
+          </p:cNvPr>
+          <p:cNvSpPr>
+            <a:spLocks noGrp="1"/>
+          </p:cNvSpPr>
+          <p:nvPr>
+            <p:ph type="sldNum" sz="quarter" idx="12"/>
+          </p:nvPr>
+        </p:nvSpPr>
+        <p:spPr/>
+        <p:txBody>
+          <a:bodyPr/>
+          <a:lstStyle/>
+          <a:p>
+            <a:fld id="{185D6EED-6655-410A-86B1-950460054D05}" type="slidenum">
+              <a:rPr lang="zh-TW" altLang="en-US" smtClean="0"/>
+              <a:t>2</a:t>
+            </a:fld>
+            <a:r>
+              <a:rPr lang="en-US" altLang="zh-TW" dirty="0"/>
+              <a:t>/7</a:t>
+            </a:r>
+            <a:endParaRPr lang="zh-TW" altLang="en-US" dirty="0"/>
+          </a:p>
+        </p:txBody>
+      </p:sp>
     </p:spTree>
     <p:extLst>
       <p:ext uri="{BB962C8B-B14F-4D97-AF65-F5344CB8AC3E}">
@@ -6540,604 +6938,18 @@
   <p:clrMapOvr>
     <a:masterClrMapping/>
   </p:clrMapOvr>
-</p:sld>
-</file>
-
-<file path=ppt/slides/slide3.xml><?xml version="1.0" encoding="utf-8"?>
-<p:sld xmlns:a="http://schemas.openxmlformats.org/drawingml/2006/main" xmlns:r="http://schemas.openxmlformats.org/officeDocument/2006/relationships" xmlns:p="http://schemas.openxmlformats.org/presentationml/2006/main">
-  <p:cSld>
-    <p:spTree>
-      <p:nvGrpSpPr>
-        <p:cNvPr id="1" name=""/>
-        <p:cNvGrpSpPr/>
-        <p:nvPr/>
-      </p:nvGrpSpPr>
-      <p:grpSpPr>
-        <a:xfrm>
-          <a:off x="0" y="0"/>
-          <a:ext cx="0" cy="0"/>
-          <a:chOff x="0" y="0"/>
-          <a:chExt cx="0" cy="0"/>
-        </a:xfrm>
-      </p:grpSpPr>
-      <p:sp>
-        <p:nvSpPr>
-          <p:cNvPr id="2" name="標題 1"/>
-          <p:cNvSpPr>
-            <a:spLocks noGrp="1"/>
-          </p:cNvSpPr>
-          <p:nvPr>
-            <p:ph type="title"/>
-          </p:nvPr>
-        </p:nvSpPr>
-        <p:spPr/>
-        <p:txBody>
-          <a:bodyPr/>
-          <a:lstStyle/>
-          <a:p>
-            <a:r>
-              <a:rPr lang="en-US" altLang="zh-TW" dirty="0" smtClean="0"/>
-              <a:t>Melody For free !</a:t>
-            </a:r>
-            <a:endParaRPr lang="zh-TW" altLang="en-US" dirty="0"/>
-          </a:p>
-        </p:txBody>
-      </p:sp>
-      <p:sp>
-        <p:nvSpPr>
-          <p:cNvPr id="3" name="內容版面配置區 2"/>
-          <p:cNvSpPr>
-            <a:spLocks noGrp="1"/>
-          </p:cNvSpPr>
-          <p:nvPr>
-            <p:ph idx="1"/>
-          </p:nvPr>
-        </p:nvSpPr>
-        <p:spPr/>
-        <p:txBody>
-          <a:bodyPr/>
-          <a:lstStyle/>
-          <a:p>
-            <a:r>
-              <a:rPr lang="en-US" altLang="zh-TW" dirty="0" smtClean="0"/>
-              <a:t>Based on the chorus progress.</a:t>
-            </a:r>
-          </a:p>
-          <a:p>
-            <a:r>
-              <a:rPr lang="en-US" altLang="zh-TW" dirty="0" smtClean="0"/>
-              <a:t>Listening and singing.</a:t>
-            </a:r>
-            <a:endParaRPr lang="zh-TW" altLang="en-US" dirty="0"/>
-          </a:p>
-        </p:txBody>
-      </p:sp>
-      <p:pic>
-        <p:nvPicPr>
-          <p:cNvPr id="4" name="圖片 3"/>
-          <p:cNvPicPr>
-            <a:picLocks noChangeAspect="1"/>
-          </p:cNvPicPr>
-          <p:nvPr/>
-        </p:nvPicPr>
-        <p:blipFill>
-          <a:blip r:embed="rId2"/>
-          <a:stretch>
-            <a:fillRect/>
-          </a:stretch>
-        </p:blipFill>
-        <p:spPr>
-          <a:xfrm>
-            <a:off x="5838444" y="1764645"/>
-            <a:ext cx="5562600" cy="4772025"/>
-          </a:xfrm>
-          <a:prstGeom prst="rect">
-            <a:avLst/>
-          </a:prstGeom>
-        </p:spPr>
-      </p:pic>
-    </p:spTree>
-    <p:extLst>
-      <p:ext uri="{BB962C8B-B14F-4D97-AF65-F5344CB8AC3E}">
-        <p14:creationId xmlns:p14="http://schemas.microsoft.com/office/powerpoint/2010/main" val="171916318"/>
-      </p:ext>
-    </p:extLst>
-  </p:cSld>
-  <p:clrMapOvr>
-    <a:masterClrMapping/>
-  </p:clrMapOvr>
-  <p:timing>
-    <p:tnLst>
-      <p:par>
-        <p:cTn id="1" dur="indefinite" restart="never" nodeType="tmRoot"/>
-      </p:par>
-    </p:tnLst>
-  </p:timing>
-</p:sld>
-</file>
-
-<file path=ppt/slides/slide4.xml><?xml version="1.0" encoding="utf-8"?>
-<p:sld xmlns:a="http://schemas.openxmlformats.org/drawingml/2006/main" xmlns:r="http://schemas.openxmlformats.org/officeDocument/2006/relationships" xmlns:p="http://schemas.openxmlformats.org/presentationml/2006/main">
-  <p:cSld>
-    <p:spTree>
-      <p:nvGrpSpPr>
-        <p:cNvPr id="1" name=""/>
-        <p:cNvGrpSpPr/>
-        <p:nvPr/>
-      </p:nvGrpSpPr>
-      <p:grpSpPr>
-        <a:xfrm>
-          <a:off x="0" y="0"/>
-          <a:ext cx="0" cy="0"/>
-          <a:chOff x="0" y="0"/>
-          <a:chExt cx="0" cy="0"/>
-        </a:xfrm>
-      </p:grpSpPr>
-      <p:sp>
-        <p:nvSpPr>
-          <p:cNvPr id="2" name="標題 1"/>
-          <p:cNvSpPr>
-            <a:spLocks noGrp="1"/>
-          </p:cNvSpPr>
-          <p:nvPr>
-            <p:ph type="title"/>
-          </p:nvPr>
-        </p:nvSpPr>
-        <p:spPr/>
-        <p:txBody>
-          <a:bodyPr/>
-          <a:lstStyle/>
-          <a:p>
-            <a:r>
-              <a:rPr lang="en-US" altLang="zh-TW" dirty="0" smtClean="0"/>
-              <a:t>What’s In Your Mood?</a:t>
-            </a:r>
-            <a:endParaRPr lang="zh-TW" altLang="en-US" dirty="0"/>
-          </a:p>
-        </p:txBody>
-      </p:sp>
-      <p:sp>
-        <p:nvSpPr>
-          <p:cNvPr id="3" name="內容版面配置區 2"/>
-          <p:cNvSpPr>
-            <a:spLocks noGrp="1"/>
-          </p:cNvSpPr>
-          <p:nvPr>
-            <p:ph idx="1"/>
-          </p:nvPr>
-        </p:nvSpPr>
-        <p:spPr>
-          <a:xfrm>
-            <a:off x="972552" y="1853248"/>
-            <a:ext cx="8946541" cy="4195481"/>
-          </a:xfrm>
-        </p:spPr>
-        <p:txBody>
-          <a:bodyPr/>
-          <a:lstStyle/>
-          <a:p>
-            <a:r>
-              <a:rPr lang="en-US" altLang="zh-TW" dirty="0" smtClean="0"/>
-              <a:t>Fill the lyrics in the melody!</a:t>
-            </a:r>
-          </a:p>
-          <a:p>
-            <a:r>
-              <a:rPr lang="en-US" altLang="zh-TW" dirty="0" smtClean="0"/>
-              <a:t>POP music seldom talks about something meaningful.</a:t>
-            </a:r>
-            <a:endParaRPr lang="zh-TW" altLang="en-US" dirty="0"/>
-          </a:p>
-        </p:txBody>
-      </p:sp>
-      <p:pic>
-        <p:nvPicPr>
-          <p:cNvPr id="4" name="圖片 3"/>
-          <p:cNvPicPr>
-            <a:picLocks noChangeAspect="1"/>
-          </p:cNvPicPr>
-          <p:nvPr/>
-        </p:nvPicPr>
-        <p:blipFill>
-          <a:blip r:embed="rId2"/>
-          <a:stretch>
-            <a:fillRect/>
-          </a:stretch>
-        </p:blipFill>
-        <p:spPr>
-          <a:xfrm>
-            <a:off x="5445823" y="3127628"/>
-            <a:ext cx="6219825" cy="3495675"/>
-          </a:xfrm>
-          <a:prstGeom prst="rect">
-            <a:avLst/>
-          </a:prstGeom>
-        </p:spPr>
-      </p:pic>
-      <p:sp>
-        <p:nvSpPr>
-          <p:cNvPr id="6" name="矩形 5"/>
-          <p:cNvSpPr/>
-          <p:nvPr/>
-        </p:nvSpPr>
-        <p:spPr>
-          <a:xfrm>
-            <a:off x="192024" y="3482378"/>
-            <a:ext cx="4809744" cy="2304288"/>
-          </a:xfrm>
-          <a:prstGeom prst="rect">
-            <a:avLst/>
-          </a:prstGeom>
-        </p:spPr>
-        <p:style>
-          <a:lnRef idx="1">
-            <a:schemeClr val="dk1"/>
-          </a:lnRef>
-          <a:fillRef idx="3">
-            <a:schemeClr val="dk1"/>
-          </a:fillRef>
-          <a:effectRef idx="2">
-            <a:schemeClr val="dk1"/>
-          </a:effectRef>
-          <a:fontRef idx="minor">
-            <a:schemeClr val="lt1"/>
-          </a:fontRef>
-        </p:style>
-        <p:txBody>
-          <a:bodyPr rtlCol="0" anchor="ctr"/>
-          <a:lstStyle/>
-          <a:p>
-            <a:pPr algn="ctr"/>
-            <a:r>
-              <a:rPr lang="en-US" altLang="zh-TW" b="1" dirty="0">
-                <a:ln w="13462">
-                  <a:solidFill>
-                    <a:schemeClr val="bg1"/>
-                  </a:solidFill>
-                  <a:prstDash val="solid"/>
-                </a:ln>
-                <a:solidFill>
-                  <a:schemeClr val="tx1">
-                    <a:lumMod val="85000"/>
-                    <a:lumOff val="15000"/>
-                  </a:schemeClr>
-                </a:solidFill>
-                <a:effectLst>
-                  <a:outerShdw dist="38100" dir="2700000" algn="bl" rotWithShape="0">
-                    <a:schemeClr val="accent5"/>
-                  </a:outerShdw>
-                </a:effectLst>
-              </a:rPr>
-              <a:t>Now watch me whip (Kill it!)</a:t>
-            </a:r>
-          </a:p>
-          <a:p>
-            <a:pPr algn="ctr"/>
-            <a:r>
-              <a:rPr lang="en-US" altLang="zh-TW" b="1" dirty="0">
-                <a:ln w="13462">
-                  <a:solidFill>
-                    <a:schemeClr val="bg1"/>
-                  </a:solidFill>
-                  <a:prstDash val="solid"/>
-                </a:ln>
-                <a:solidFill>
-                  <a:schemeClr val="tx1">
-                    <a:lumMod val="85000"/>
-                    <a:lumOff val="15000"/>
-                  </a:schemeClr>
-                </a:solidFill>
-                <a:effectLst>
-                  <a:outerShdw dist="38100" dir="2700000" algn="bl" rotWithShape="0">
-                    <a:schemeClr val="accent5"/>
-                  </a:outerShdw>
-                </a:effectLst>
-              </a:rPr>
-              <a:t>Now watch me </a:t>
-            </a:r>
-            <a:r>
-              <a:rPr lang="en-US" altLang="zh-TW" b="1" dirty="0" err="1">
-                <a:ln w="13462">
-                  <a:solidFill>
-                    <a:schemeClr val="bg1"/>
-                  </a:solidFill>
-                  <a:prstDash val="solid"/>
-                </a:ln>
-                <a:solidFill>
-                  <a:schemeClr val="tx1">
-                    <a:lumMod val="85000"/>
-                    <a:lumOff val="15000"/>
-                  </a:schemeClr>
-                </a:solidFill>
-                <a:effectLst>
-                  <a:outerShdw dist="38100" dir="2700000" algn="bl" rotWithShape="0">
-                    <a:schemeClr val="accent5"/>
-                  </a:outerShdw>
-                </a:effectLst>
-              </a:rPr>
-              <a:t>nae</a:t>
-            </a:r>
-            <a:r>
-              <a:rPr lang="en-US" altLang="zh-TW" b="1" dirty="0">
-                <a:ln w="13462">
-                  <a:solidFill>
-                    <a:schemeClr val="bg1"/>
-                  </a:solidFill>
-                  <a:prstDash val="solid"/>
-                </a:ln>
-                <a:solidFill>
-                  <a:schemeClr val="tx1">
-                    <a:lumMod val="85000"/>
-                    <a:lumOff val="15000"/>
-                  </a:schemeClr>
-                </a:solidFill>
-                <a:effectLst>
-                  <a:outerShdw dist="38100" dir="2700000" algn="bl" rotWithShape="0">
-                    <a:schemeClr val="accent5"/>
-                  </a:outerShdw>
-                </a:effectLst>
-              </a:rPr>
-              <a:t> </a:t>
-            </a:r>
-            <a:r>
-              <a:rPr lang="en-US" altLang="zh-TW" b="1" dirty="0" err="1">
-                <a:ln w="13462">
-                  <a:solidFill>
-                    <a:schemeClr val="bg1"/>
-                  </a:solidFill>
-                  <a:prstDash val="solid"/>
-                </a:ln>
-                <a:solidFill>
-                  <a:schemeClr val="tx1">
-                    <a:lumMod val="85000"/>
-                    <a:lumOff val="15000"/>
-                  </a:schemeClr>
-                </a:solidFill>
-                <a:effectLst>
-                  <a:outerShdw dist="38100" dir="2700000" algn="bl" rotWithShape="0">
-                    <a:schemeClr val="accent5"/>
-                  </a:outerShdw>
-                </a:effectLst>
-              </a:rPr>
-              <a:t>nae</a:t>
-            </a:r>
-            <a:r>
-              <a:rPr lang="en-US" altLang="zh-TW" b="1" dirty="0">
-                <a:ln w="13462">
-                  <a:solidFill>
-                    <a:schemeClr val="bg1"/>
-                  </a:solidFill>
-                  <a:prstDash val="solid"/>
-                </a:ln>
-                <a:solidFill>
-                  <a:schemeClr val="tx1">
-                    <a:lumMod val="85000"/>
-                    <a:lumOff val="15000"/>
-                  </a:schemeClr>
-                </a:solidFill>
-                <a:effectLst>
-                  <a:outerShdw dist="38100" dir="2700000" algn="bl" rotWithShape="0">
-                    <a:schemeClr val="accent5"/>
-                  </a:outerShdw>
-                </a:effectLst>
-              </a:rPr>
-              <a:t> (Okay!)</a:t>
-            </a:r>
-          </a:p>
-          <a:p>
-            <a:pPr algn="ctr"/>
-            <a:r>
-              <a:rPr lang="en-US" altLang="zh-TW" b="1" dirty="0">
-                <a:ln w="13462">
-                  <a:solidFill>
-                    <a:schemeClr val="bg1"/>
-                  </a:solidFill>
-                  <a:prstDash val="solid"/>
-                </a:ln>
-                <a:solidFill>
-                  <a:schemeClr val="tx1">
-                    <a:lumMod val="85000"/>
-                    <a:lumOff val="15000"/>
-                  </a:schemeClr>
-                </a:solidFill>
-                <a:effectLst>
-                  <a:outerShdw dist="38100" dir="2700000" algn="bl" rotWithShape="0">
-                    <a:schemeClr val="accent5"/>
-                  </a:outerShdw>
-                </a:effectLst>
-              </a:rPr>
-              <a:t>Now watch me whip </a:t>
-            </a:r>
-            <a:r>
-              <a:rPr lang="en-US" altLang="zh-TW" b="1" dirty="0" err="1">
-                <a:ln w="13462">
-                  <a:solidFill>
-                    <a:schemeClr val="bg1"/>
-                  </a:solidFill>
-                  <a:prstDash val="solid"/>
-                </a:ln>
-                <a:solidFill>
-                  <a:schemeClr val="tx1">
-                    <a:lumMod val="85000"/>
-                    <a:lumOff val="15000"/>
-                  </a:schemeClr>
-                </a:solidFill>
-                <a:effectLst>
-                  <a:outerShdw dist="38100" dir="2700000" algn="bl" rotWithShape="0">
-                    <a:schemeClr val="accent5"/>
-                  </a:outerShdw>
-                </a:effectLst>
-              </a:rPr>
-              <a:t>whip</a:t>
-            </a:r>
-            <a:endParaRPr lang="en-US" altLang="zh-TW" b="1" dirty="0">
-              <a:ln w="13462">
-                <a:solidFill>
-                  <a:schemeClr val="bg1"/>
-                </a:solidFill>
-                <a:prstDash val="solid"/>
-              </a:ln>
-              <a:solidFill>
-                <a:schemeClr val="tx1">
-                  <a:lumMod val="85000"/>
-                  <a:lumOff val="15000"/>
-                </a:schemeClr>
-              </a:solidFill>
-              <a:effectLst>
-                <a:outerShdw dist="38100" dir="2700000" algn="bl" rotWithShape="0">
-                  <a:schemeClr val="accent5"/>
-                </a:outerShdw>
-              </a:effectLst>
-            </a:endParaRPr>
-          </a:p>
-          <a:p>
-            <a:pPr algn="ctr"/>
-            <a:r>
-              <a:rPr lang="en-US" altLang="zh-TW" b="1" dirty="0">
-                <a:ln w="13462">
-                  <a:solidFill>
-                    <a:schemeClr val="bg1"/>
-                  </a:solidFill>
-                  <a:prstDash val="solid"/>
-                </a:ln>
-                <a:solidFill>
-                  <a:schemeClr val="tx1">
-                    <a:lumMod val="85000"/>
-                    <a:lumOff val="15000"/>
-                  </a:schemeClr>
-                </a:solidFill>
-                <a:effectLst>
-                  <a:outerShdw dist="38100" dir="2700000" algn="bl" rotWithShape="0">
-                    <a:schemeClr val="accent5"/>
-                  </a:outerShdw>
-                </a:effectLst>
-              </a:rPr>
-              <a:t>Watch me </a:t>
-            </a:r>
-            <a:r>
-              <a:rPr lang="en-US" altLang="zh-TW" b="1" dirty="0" err="1">
-                <a:ln w="13462">
-                  <a:solidFill>
-                    <a:schemeClr val="bg1"/>
-                  </a:solidFill>
-                  <a:prstDash val="solid"/>
-                </a:ln>
-                <a:solidFill>
-                  <a:schemeClr val="tx1">
-                    <a:lumMod val="85000"/>
-                    <a:lumOff val="15000"/>
-                  </a:schemeClr>
-                </a:solidFill>
-                <a:effectLst>
-                  <a:outerShdw dist="38100" dir="2700000" algn="bl" rotWithShape="0">
-                    <a:schemeClr val="accent5"/>
-                  </a:outerShdw>
-                </a:effectLst>
-              </a:rPr>
-              <a:t>nae</a:t>
-            </a:r>
-            <a:r>
-              <a:rPr lang="en-US" altLang="zh-TW" b="1" dirty="0">
-                <a:ln w="13462">
-                  <a:solidFill>
-                    <a:schemeClr val="bg1"/>
-                  </a:solidFill>
-                  <a:prstDash val="solid"/>
-                </a:ln>
-                <a:solidFill>
-                  <a:schemeClr val="tx1">
-                    <a:lumMod val="85000"/>
-                    <a:lumOff val="15000"/>
-                  </a:schemeClr>
-                </a:solidFill>
-                <a:effectLst>
-                  <a:outerShdw dist="38100" dir="2700000" algn="bl" rotWithShape="0">
-                    <a:schemeClr val="accent5"/>
-                  </a:outerShdw>
-                </a:effectLst>
-              </a:rPr>
-              <a:t> </a:t>
-            </a:r>
-            <a:r>
-              <a:rPr lang="en-US" altLang="zh-TW" b="1" dirty="0" err="1">
-                <a:ln w="13462">
-                  <a:solidFill>
-                    <a:schemeClr val="bg1"/>
-                  </a:solidFill>
-                  <a:prstDash val="solid"/>
-                </a:ln>
-                <a:solidFill>
-                  <a:schemeClr val="tx1">
-                    <a:lumMod val="85000"/>
-                    <a:lumOff val="15000"/>
-                  </a:schemeClr>
-                </a:solidFill>
-                <a:effectLst>
-                  <a:outerShdw dist="38100" dir="2700000" algn="bl" rotWithShape="0">
-                    <a:schemeClr val="accent5"/>
-                  </a:outerShdw>
-                </a:effectLst>
-              </a:rPr>
-              <a:t>nae</a:t>
-            </a:r>
-            <a:r>
-              <a:rPr lang="en-US" altLang="zh-TW" b="1" dirty="0">
-                <a:ln w="13462">
-                  <a:solidFill>
-                    <a:schemeClr val="bg1"/>
-                  </a:solidFill>
-                  <a:prstDash val="solid"/>
-                </a:ln>
-                <a:solidFill>
-                  <a:schemeClr val="tx1">
-                    <a:lumMod val="85000"/>
-                    <a:lumOff val="15000"/>
-                  </a:schemeClr>
-                </a:solidFill>
-                <a:effectLst>
-                  <a:outerShdw dist="38100" dir="2700000" algn="bl" rotWithShape="0">
-                    <a:schemeClr val="accent5"/>
-                  </a:outerShdw>
-                </a:effectLst>
-              </a:rPr>
-              <a:t> (Want me do it?)</a:t>
-            </a:r>
-            <a:endParaRPr lang="zh-TW" altLang="en-US" b="1" dirty="0">
-              <a:ln w="13462">
-                <a:solidFill>
-                  <a:schemeClr val="bg1"/>
-                </a:solidFill>
-                <a:prstDash val="solid"/>
-              </a:ln>
-              <a:solidFill>
-                <a:schemeClr val="tx1">
-                  <a:lumMod val="85000"/>
-                  <a:lumOff val="15000"/>
-                </a:schemeClr>
-              </a:solidFill>
-              <a:effectLst>
-                <a:outerShdw dist="38100" dir="2700000" algn="bl" rotWithShape="0">
-                  <a:schemeClr val="accent5"/>
-                </a:outerShdw>
-              </a:effectLst>
-            </a:endParaRPr>
-          </a:p>
-          <a:p>
-            <a:pPr algn="ctr"/>
-            <a:endParaRPr lang="zh-TW" altLang="en-US" dirty="0"/>
-          </a:p>
-        </p:txBody>
-      </p:sp>
-    </p:spTree>
-    <p:extLst>
-      <p:ext uri="{BB962C8B-B14F-4D97-AF65-F5344CB8AC3E}">
-        <p14:creationId xmlns:p14="http://schemas.microsoft.com/office/powerpoint/2010/main" val="2193657244"/>
-      </p:ext>
-    </p:extLst>
-  </p:cSld>
-  <p:clrMapOvr>
-    <a:masterClrMapping/>
-  </p:clrMapOvr>
+  <mc:AlternateContent xmlns:mc="http://schemas.openxmlformats.org/markup-compatibility/2006">
+    <mc:Choice xmlns:p14="http://schemas.microsoft.com/office/powerpoint/2010/main" Requires="p14">
+      <p:transition spd="slow" p14:dur="1500">
+        <p:split orient="vert"/>
+      </p:transition>
+    </mc:Choice>
+    <mc:Fallback>
+      <p:transition spd="slow">
+        <p:split orient="vert"/>
+      </p:transition>
+    </mc:Fallback>
+  </mc:AlternateContent>
   <p:timing>
     <p:tnLst>
       <p:par>
@@ -7159,7 +6971,7 @@
                             </p:stCondLst>
                             <p:childTnLst>
                               <p:par>
-                                <p:cTn id="5" presetID="42" presetClass="entr" presetSubtype="0" fill="hold" grpId="0" nodeType="clickEffect">
+                                <p:cTn id="5" presetID="10" presetClass="entr" presetSubtype="0" fill="hold" grpId="0" nodeType="clickEffect">
                                   <p:stCondLst>
                                     <p:cond delay="0"/>
                                   </p:stCondLst>
@@ -7167,6 +6979,999 @@
                                     <p:set>
                                       <p:cBhvr>
                                         <p:cTn id="6" dur="1" fill="hold">
+                                          <p:stCondLst>
+                                            <p:cond delay="0"/>
+                                          </p:stCondLst>
+                                        </p:cTn>
+                                        <p:tgtEl>
+                                          <p:spTgt spid="3">
+                                            <p:txEl>
+                                              <p:pRg st="0" end="0"/>
+                                            </p:txEl>
+                                          </p:spTgt>
+                                        </p:tgtEl>
+                                        <p:attrNameLst>
+                                          <p:attrName>style.visibility</p:attrName>
+                                        </p:attrNameLst>
+                                      </p:cBhvr>
+                                      <p:to>
+                                        <p:strVal val="visible"/>
+                                      </p:to>
+                                    </p:set>
+                                    <p:animEffect transition="in" filter="fade">
+                                      <p:cBhvr>
+                                        <p:cTn id="7" dur="500"/>
+                                        <p:tgtEl>
+                                          <p:spTgt spid="3">
+                                            <p:txEl>
+                                              <p:pRg st="0" end="0"/>
+                                            </p:txEl>
+                                          </p:spTgt>
+                                        </p:tgtEl>
+                                      </p:cBhvr>
+                                    </p:animEffect>
+                                  </p:childTnLst>
+                                </p:cTn>
+                              </p:par>
+                              <p:par>
+                                <p:cTn id="8" presetID="10" presetClass="entr" presetSubtype="0" fill="hold" nodeType="withEffect">
+                                  <p:stCondLst>
+                                    <p:cond delay="0"/>
+                                  </p:stCondLst>
+                                  <p:childTnLst>
+                                    <p:set>
+                                      <p:cBhvr>
+                                        <p:cTn id="9" dur="1" fill="hold">
+                                          <p:stCondLst>
+                                            <p:cond delay="0"/>
+                                          </p:stCondLst>
+                                        </p:cTn>
+                                        <p:tgtEl>
+                                          <p:spTgt spid="5"/>
+                                        </p:tgtEl>
+                                        <p:attrNameLst>
+                                          <p:attrName>style.visibility</p:attrName>
+                                        </p:attrNameLst>
+                                      </p:cBhvr>
+                                      <p:to>
+                                        <p:strVal val="visible"/>
+                                      </p:to>
+                                    </p:set>
+                                    <p:animEffect transition="in" filter="fade">
+                                      <p:cBhvr>
+                                        <p:cTn id="10" dur="500"/>
+                                        <p:tgtEl>
+                                          <p:spTgt spid="5"/>
+                                        </p:tgtEl>
+                                      </p:cBhvr>
+                                    </p:animEffect>
+                                  </p:childTnLst>
+                                </p:cTn>
+                              </p:par>
+                            </p:childTnLst>
+                          </p:cTn>
+                        </p:par>
+                      </p:childTnLst>
+                    </p:cTn>
+                  </p:par>
+                  <p:par>
+                    <p:cTn id="11" fill="hold">
+                      <p:stCondLst>
+                        <p:cond delay="indefinite"/>
+                      </p:stCondLst>
+                      <p:childTnLst>
+                        <p:par>
+                          <p:cTn id="12" fill="hold">
+                            <p:stCondLst>
+                              <p:cond delay="0"/>
+                            </p:stCondLst>
+                            <p:childTnLst>
+                              <p:par>
+                                <p:cTn id="13" presetID="10" presetClass="entr" presetSubtype="0" fill="hold" grpId="0" nodeType="clickEffect">
+                                  <p:stCondLst>
+                                    <p:cond delay="0"/>
+                                  </p:stCondLst>
+                                  <p:childTnLst>
+                                    <p:set>
+                                      <p:cBhvr>
+                                        <p:cTn id="14" dur="1" fill="hold">
+                                          <p:stCondLst>
+                                            <p:cond delay="0"/>
+                                          </p:stCondLst>
+                                        </p:cTn>
+                                        <p:tgtEl>
+                                          <p:spTgt spid="6">
+                                            <p:txEl>
+                                              <p:pRg st="0" end="0"/>
+                                            </p:txEl>
+                                          </p:spTgt>
+                                        </p:tgtEl>
+                                        <p:attrNameLst>
+                                          <p:attrName>style.visibility</p:attrName>
+                                        </p:attrNameLst>
+                                      </p:cBhvr>
+                                      <p:to>
+                                        <p:strVal val="visible"/>
+                                      </p:to>
+                                    </p:set>
+                                    <p:animEffect transition="in" filter="fade">
+                                      <p:cBhvr>
+                                        <p:cTn id="15" dur="500"/>
+                                        <p:tgtEl>
+                                          <p:spTgt spid="6">
+                                            <p:txEl>
+                                              <p:pRg st="0" end="0"/>
+                                            </p:txEl>
+                                          </p:spTgt>
+                                        </p:tgtEl>
+                                      </p:cBhvr>
+                                    </p:animEffect>
+                                  </p:childTnLst>
+                                </p:cTn>
+                              </p:par>
+                              <p:par>
+                                <p:cTn id="16" presetID="10" presetClass="entr" presetSubtype="0" fill="hold" nodeType="withEffect">
+                                  <p:stCondLst>
+                                    <p:cond delay="0"/>
+                                  </p:stCondLst>
+                                  <p:childTnLst>
+                                    <p:set>
+                                      <p:cBhvr>
+                                        <p:cTn id="17" dur="1" fill="hold">
+                                          <p:stCondLst>
+                                            <p:cond delay="0"/>
+                                          </p:stCondLst>
+                                        </p:cTn>
+                                        <p:tgtEl>
+                                          <p:spTgt spid="9"/>
+                                        </p:tgtEl>
+                                        <p:attrNameLst>
+                                          <p:attrName>style.visibility</p:attrName>
+                                        </p:attrNameLst>
+                                      </p:cBhvr>
+                                      <p:to>
+                                        <p:strVal val="visible"/>
+                                      </p:to>
+                                    </p:set>
+                                    <p:animEffect transition="in" filter="fade">
+                                      <p:cBhvr>
+                                        <p:cTn id="18" dur="500"/>
+                                        <p:tgtEl>
+                                          <p:spTgt spid="9"/>
+                                        </p:tgtEl>
+                                      </p:cBhvr>
+                                    </p:animEffect>
+                                  </p:childTnLst>
+                                </p:cTn>
+                              </p:par>
+                            </p:childTnLst>
+                          </p:cTn>
+                        </p:par>
+                      </p:childTnLst>
+                    </p:cTn>
+                  </p:par>
+                  <p:par>
+                    <p:cTn id="19" fill="hold">
+                      <p:stCondLst>
+                        <p:cond delay="indefinite"/>
+                      </p:stCondLst>
+                      <p:childTnLst>
+                        <p:par>
+                          <p:cTn id="20" fill="hold">
+                            <p:stCondLst>
+                              <p:cond delay="0"/>
+                            </p:stCondLst>
+                            <p:childTnLst>
+                              <p:par>
+                                <p:cTn id="21" presetID="10" presetClass="entr" presetSubtype="0" fill="hold" grpId="0" nodeType="clickEffect">
+                                  <p:stCondLst>
+                                    <p:cond delay="0"/>
+                                  </p:stCondLst>
+                                  <p:childTnLst>
+                                    <p:set>
+                                      <p:cBhvr>
+                                        <p:cTn id="22" dur="1" fill="hold">
+                                          <p:stCondLst>
+                                            <p:cond delay="0"/>
+                                          </p:stCondLst>
+                                        </p:cTn>
+                                        <p:tgtEl>
+                                          <p:spTgt spid="10"/>
+                                        </p:tgtEl>
+                                        <p:attrNameLst>
+                                          <p:attrName>style.visibility</p:attrName>
+                                        </p:attrNameLst>
+                                      </p:cBhvr>
+                                      <p:to>
+                                        <p:strVal val="visible"/>
+                                      </p:to>
+                                    </p:set>
+                                    <p:animEffect transition="in" filter="fade">
+                                      <p:cBhvr>
+                                        <p:cTn id="23" dur="500"/>
+                                        <p:tgtEl>
+                                          <p:spTgt spid="10"/>
+                                        </p:tgtEl>
+                                      </p:cBhvr>
+                                    </p:animEffect>
+                                  </p:childTnLst>
+                                </p:cTn>
+                              </p:par>
+                            </p:childTnLst>
+                          </p:cTn>
+                        </p:par>
+                      </p:childTnLst>
+                    </p:cTn>
+                  </p:par>
+                </p:childTnLst>
+              </p:cTn>
+              <p:prevCondLst>
+                <p:cond evt="onPrev" delay="0">
+                  <p:tgtEl>
+                    <p:sldTgt/>
+                  </p:tgtEl>
+                </p:cond>
+              </p:prevCondLst>
+              <p:nextCondLst>
+                <p:cond evt="onNext" delay="0">
+                  <p:tgtEl>
+                    <p:sldTgt/>
+                  </p:tgtEl>
+                </p:cond>
+              </p:nextCondLst>
+            </p:seq>
+          </p:childTnLst>
+        </p:cTn>
+      </p:par>
+    </p:tnLst>
+    <p:bldLst>
+      <p:bldP spid="3" grpId="0" build="p"/>
+      <p:bldP spid="6" grpId="0" build="p"/>
+      <p:bldP spid="10" grpId="0"/>
+    </p:bldLst>
+  </p:timing>
+</p:sld>
+</file>
+
+<file path=ppt/slides/slide3.xml><?xml version="1.0" encoding="utf-8"?>
+<p:sld xmlns:a="http://schemas.openxmlformats.org/drawingml/2006/main" xmlns:r="http://schemas.openxmlformats.org/officeDocument/2006/relationships" xmlns:p="http://schemas.openxmlformats.org/presentationml/2006/main">
+  <p:cSld>
+    <p:spTree>
+      <p:nvGrpSpPr>
+        <p:cNvPr id="1" name=""/>
+        <p:cNvGrpSpPr/>
+        <p:nvPr/>
+      </p:nvGrpSpPr>
+      <p:grpSpPr>
+        <a:xfrm>
+          <a:off x="0" y="0"/>
+          <a:ext cx="0" cy="0"/>
+          <a:chOff x="0" y="0"/>
+          <a:chExt cx="0" cy="0"/>
+        </a:xfrm>
+      </p:grpSpPr>
+      <p:sp>
+        <p:nvSpPr>
+          <p:cNvPr id="2" name="標題 1"/>
+          <p:cNvSpPr>
+            <a:spLocks noGrp="1"/>
+          </p:cNvSpPr>
+          <p:nvPr>
+            <p:ph type="title"/>
+          </p:nvPr>
+        </p:nvSpPr>
+        <p:spPr/>
+        <p:txBody>
+          <a:bodyPr/>
+          <a:lstStyle/>
+          <a:p>
+            <a:r>
+              <a:rPr lang="en-US" altLang="zh-TW" dirty="0"/>
+              <a:t>What’s In Your Mood?</a:t>
+            </a:r>
+            <a:endParaRPr lang="zh-TW" altLang="en-US" dirty="0"/>
+          </a:p>
+        </p:txBody>
+      </p:sp>
+      <p:sp>
+        <p:nvSpPr>
+          <p:cNvPr id="3" name="內容版面配置區 2"/>
+          <p:cNvSpPr>
+            <a:spLocks noGrp="1"/>
+          </p:cNvSpPr>
+          <p:nvPr>
+            <p:ph idx="1"/>
+          </p:nvPr>
+        </p:nvSpPr>
+        <p:spPr>
+          <a:xfrm>
+            <a:off x="972552" y="1853248"/>
+            <a:ext cx="8946541" cy="4195481"/>
+          </a:xfrm>
+        </p:spPr>
+        <p:txBody>
+          <a:bodyPr/>
+          <a:lstStyle/>
+          <a:p>
+            <a:r>
+              <a:rPr lang="en-US" altLang="zh-TW" dirty="0"/>
+              <a:t>Fill the lyrics in the melody!</a:t>
+            </a:r>
+          </a:p>
+          <a:p>
+            <a:r>
+              <a:rPr lang="en-US" altLang="zh-TW" dirty="0"/>
+              <a:t>POP music always talks about something </a:t>
+            </a:r>
+            <a:r>
+              <a:rPr lang="en-US" altLang="zh-TW" b="1" dirty="0"/>
+              <a:t>unmeaningful</a:t>
+            </a:r>
+            <a:r>
+              <a:rPr lang="en-US" altLang="zh-TW" dirty="0"/>
+              <a:t>.</a:t>
+            </a:r>
+            <a:endParaRPr lang="zh-TW" altLang="en-US" dirty="0"/>
+          </a:p>
+        </p:txBody>
+      </p:sp>
+      <p:pic>
+        <p:nvPicPr>
+          <p:cNvPr id="4" name="圖片 3"/>
+          <p:cNvPicPr>
+            <a:picLocks noChangeAspect="1"/>
+          </p:cNvPicPr>
+          <p:nvPr/>
+        </p:nvPicPr>
+        <p:blipFill>
+          <a:blip r:embed="rId2"/>
+          <a:stretch>
+            <a:fillRect/>
+          </a:stretch>
+        </p:blipFill>
+        <p:spPr>
+          <a:xfrm>
+            <a:off x="7308235" y="3925456"/>
+            <a:ext cx="4357414" cy="2448960"/>
+          </a:xfrm>
+          <a:prstGeom prst="rect">
+            <a:avLst/>
+          </a:prstGeom>
+        </p:spPr>
+      </p:pic>
+      <p:sp>
+        <p:nvSpPr>
+          <p:cNvPr id="6" name="矩形 5"/>
+          <p:cNvSpPr/>
+          <p:nvPr/>
+        </p:nvSpPr>
+        <p:spPr>
+          <a:xfrm>
+            <a:off x="182787" y="3029795"/>
+            <a:ext cx="6541285" cy="3344619"/>
+          </a:xfrm>
+          <a:prstGeom prst="rect">
+            <a:avLst/>
+          </a:prstGeom>
+        </p:spPr>
+        <p:style>
+          <a:lnRef idx="1">
+            <a:schemeClr val="dk1"/>
+          </a:lnRef>
+          <a:fillRef idx="3">
+            <a:schemeClr val="dk1"/>
+          </a:fillRef>
+          <a:effectRef idx="2">
+            <a:schemeClr val="dk1"/>
+          </a:effectRef>
+          <a:fontRef idx="minor">
+            <a:schemeClr val="lt1"/>
+          </a:fontRef>
+        </p:style>
+        <p:txBody>
+          <a:bodyPr rtlCol="0" anchor="ctr"/>
+          <a:lstStyle/>
+          <a:p>
+            <a:pPr algn="ctr"/>
+            <a:r>
+              <a:rPr lang="en-US" altLang="zh-TW" sz="2850" b="1" dirty="0">
+                <a:ln w="13462">
+                  <a:solidFill>
+                    <a:schemeClr val="bg1"/>
+                  </a:solidFill>
+                  <a:prstDash val="solid"/>
+                </a:ln>
+                <a:solidFill>
+                  <a:schemeClr val="tx1">
+                    <a:lumMod val="85000"/>
+                    <a:lumOff val="15000"/>
+                  </a:schemeClr>
+                </a:solidFill>
+                <a:effectLst>
+                  <a:outerShdw dist="38100" dir="2700000" algn="bl" rotWithShape="0">
+                    <a:schemeClr val="accent5"/>
+                  </a:outerShdw>
+                </a:effectLst>
+              </a:rPr>
+              <a:t>Now watch me whip (Kill it!)</a:t>
+            </a:r>
+          </a:p>
+          <a:p>
+            <a:pPr algn="ctr"/>
+            <a:r>
+              <a:rPr lang="en-US" altLang="zh-TW" sz="2850" b="1" dirty="0">
+                <a:ln w="13462">
+                  <a:solidFill>
+                    <a:schemeClr val="bg1"/>
+                  </a:solidFill>
+                  <a:prstDash val="solid"/>
+                </a:ln>
+                <a:solidFill>
+                  <a:schemeClr val="tx1">
+                    <a:lumMod val="85000"/>
+                    <a:lumOff val="15000"/>
+                  </a:schemeClr>
+                </a:solidFill>
+                <a:effectLst>
+                  <a:outerShdw dist="38100" dir="2700000" algn="bl" rotWithShape="0">
+                    <a:schemeClr val="accent5"/>
+                  </a:outerShdw>
+                </a:effectLst>
+              </a:rPr>
+              <a:t>Now watch me </a:t>
+            </a:r>
+            <a:r>
+              <a:rPr lang="en-US" altLang="zh-TW" sz="2850" b="1" dirty="0" err="1">
+                <a:ln w="13462">
+                  <a:solidFill>
+                    <a:schemeClr val="bg1"/>
+                  </a:solidFill>
+                  <a:prstDash val="solid"/>
+                </a:ln>
+                <a:solidFill>
+                  <a:schemeClr val="tx1">
+                    <a:lumMod val="85000"/>
+                    <a:lumOff val="15000"/>
+                  </a:schemeClr>
+                </a:solidFill>
+                <a:effectLst>
+                  <a:outerShdw dist="38100" dir="2700000" algn="bl" rotWithShape="0">
+                    <a:schemeClr val="accent5"/>
+                  </a:outerShdw>
+                </a:effectLst>
+              </a:rPr>
+              <a:t>nae</a:t>
+            </a:r>
+            <a:r>
+              <a:rPr lang="en-US" altLang="zh-TW" sz="2850" b="1" dirty="0">
+                <a:ln w="13462">
+                  <a:solidFill>
+                    <a:schemeClr val="bg1"/>
+                  </a:solidFill>
+                  <a:prstDash val="solid"/>
+                </a:ln>
+                <a:solidFill>
+                  <a:schemeClr val="tx1">
+                    <a:lumMod val="85000"/>
+                    <a:lumOff val="15000"/>
+                  </a:schemeClr>
+                </a:solidFill>
+                <a:effectLst>
+                  <a:outerShdw dist="38100" dir="2700000" algn="bl" rotWithShape="0">
+                    <a:schemeClr val="accent5"/>
+                  </a:outerShdw>
+                </a:effectLst>
+              </a:rPr>
+              <a:t> </a:t>
+            </a:r>
+            <a:r>
+              <a:rPr lang="en-US" altLang="zh-TW" sz="2850" b="1" dirty="0" err="1">
+                <a:ln w="13462">
+                  <a:solidFill>
+                    <a:schemeClr val="bg1"/>
+                  </a:solidFill>
+                  <a:prstDash val="solid"/>
+                </a:ln>
+                <a:solidFill>
+                  <a:schemeClr val="tx1">
+                    <a:lumMod val="85000"/>
+                    <a:lumOff val="15000"/>
+                  </a:schemeClr>
+                </a:solidFill>
+                <a:effectLst>
+                  <a:outerShdw dist="38100" dir="2700000" algn="bl" rotWithShape="0">
+                    <a:schemeClr val="accent5"/>
+                  </a:outerShdw>
+                </a:effectLst>
+              </a:rPr>
+              <a:t>nae</a:t>
+            </a:r>
+            <a:r>
+              <a:rPr lang="en-US" altLang="zh-TW" sz="2850" b="1" dirty="0">
+                <a:ln w="13462">
+                  <a:solidFill>
+                    <a:schemeClr val="bg1"/>
+                  </a:solidFill>
+                  <a:prstDash val="solid"/>
+                </a:ln>
+                <a:solidFill>
+                  <a:schemeClr val="tx1">
+                    <a:lumMod val="85000"/>
+                    <a:lumOff val="15000"/>
+                  </a:schemeClr>
+                </a:solidFill>
+                <a:effectLst>
+                  <a:outerShdw dist="38100" dir="2700000" algn="bl" rotWithShape="0">
+                    <a:schemeClr val="accent5"/>
+                  </a:outerShdw>
+                </a:effectLst>
+              </a:rPr>
+              <a:t> (Okay!)</a:t>
+            </a:r>
+          </a:p>
+          <a:p>
+            <a:pPr algn="ctr"/>
+            <a:r>
+              <a:rPr lang="en-US" altLang="zh-TW" sz="2850" b="1" dirty="0">
+                <a:ln w="13462">
+                  <a:solidFill>
+                    <a:schemeClr val="bg1"/>
+                  </a:solidFill>
+                  <a:prstDash val="solid"/>
+                </a:ln>
+                <a:solidFill>
+                  <a:schemeClr val="tx1">
+                    <a:lumMod val="85000"/>
+                    <a:lumOff val="15000"/>
+                  </a:schemeClr>
+                </a:solidFill>
+                <a:effectLst>
+                  <a:outerShdw dist="38100" dir="2700000" algn="bl" rotWithShape="0">
+                    <a:schemeClr val="accent5"/>
+                  </a:outerShdw>
+                </a:effectLst>
+              </a:rPr>
+              <a:t>Now watch me whip </a:t>
+            </a:r>
+            <a:r>
+              <a:rPr lang="en-US" altLang="zh-TW" sz="2850" b="1" dirty="0" err="1">
+                <a:ln w="13462">
+                  <a:solidFill>
+                    <a:schemeClr val="bg1"/>
+                  </a:solidFill>
+                  <a:prstDash val="solid"/>
+                </a:ln>
+                <a:solidFill>
+                  <a:schemeClr val="tx1">
+                    <a:lumMod val="85000"/>
+                    <a:lumOff val="15000"/>
+                  </a:schemeClr>
+                </a:solidFill>
+                <a:effectLst>
+                  <a:outerShdw dist="38100" dir="2700000" algn="bl" rotWithShape="0">
+                    <a:schemeClr val="accent5"/>
+                  </a:outerShdw>
+                </a:effectLst>
+              </a:rPr>
+              <a:t>whip</a:t>
+            </a:r>
+            <a:endParaRPr lang="en-US" altLang="zh-TW" sz="2850" b="1" dirty="0">
+              <a:ln w="13462">
+                <a:solidFill>
+                  <a:schemeClr val="bg1"/>
+                </a:solidFill>
+                <a:prstDash val="solid"/>
+              </a:ln>
+              <a:solidFill>
+                <a:schemeClr val="tx1">
+                  <a:lumMod val="85000"/>
+                  <a:lumOff val="15000"/>
+                </a:schemeClr>
+              </a:solidFill>
+              <a:effectLst>
+                <a:outerShdw dist="38100" dir="2700000" algn="bl" rotWithShape="0">
+                  <a:schemeClr val="accent5"/>
+                </a:outerShdw>
+              </a:effectLst>
+            </a:endParaRPr>
+          </a:p>
+          <a:p>
+            <a:pPr algn="ctr"/>
+            <a:r>
+              <a:rPr lang="en-US" altLang="zh-TW" sz="2850" b="1" dirty="0">
+                <a:ln w="13462">
+                  <a:solidFill>
+                    <a:schemeClr val="bg1"/>
+                  </a:solidFill>
+                  <a:prstDash val="solid"/>
+                </a:ln>
+                <a:solidFill>
+                  <a:schemeClr val="tx1">
+                    <a:lumMod val="85000"/>
+                    <a:lumOff val="15000"/>
+                  </a:schemeClr>
+                </a:solidFill>
+                <a:effectLst>
+                  <a:outerShdw dist="38100" dir="2700000" algn="bl" rotWithShape="0">
+                    <a:schemeClr val="accent5"/>
+                  </a:outerShdw>
+                </a:effectLst>
+              </a:rPr>
+              <a:t>Watch me </a:t>
+            </a:r>
+            <a:r>
+              <a:rPr lang="en-US" altLang="zh-TW" sz="2850" b="1" dirty="0" err="1">
+                <a:ln w="13462">
+                  <a:solidFill>
+                    <a:schemeClr val="bg1"/>
+                  </a:solidFill>
+                  <a:prstDash val="solid"/>
+                </a:ln>
+                <a:solidFill>
+                  <a:schemeClr val="tx1">
+                    <a:lumMod val="85000"/>
+                    <a:lumOff val="15000"/>
+                  </a:schemeClr>
+                </a:solidFill>
+                <a:effectLst>
+                  <a:outerShdw dist="38100" dir="2700000" algn="bl" rotWithShape="0">
+                    <a:schemeClr val="accent5"/>
+                  </a:outerShdw>
+                </a:effectLst>
+              </a:rPr>
+              <a:t>nae</a:t>
+            </a:r>
+            <a:r>
+              <a:rPr lang="en-US" altLang="zh-TW" sz="2850" b="1" dirty="0">
+                <a:ln w="13462">
+                  <a:solidFill>
+                    <a:schemeClr val="bg1"/>
+                  </a:solidFill>
+                  <a:prstDash val="solid"/>
+                </a:ln>
+                <a:solidFill>
+                  <a:schemeClr val="tx1">
+                    <a:lumMod val="85000"/>
+                    <a:lumOff val="15000"/>
+                  </a:schemeClr>
+                </a:solidFill>
+                <a:effectLst>
+                  <a:outerShdw dist="38100" dir="2700000" algn="bl" rotWithShape="0">
+                    <a:schemeClr val="accent5"/>
+                  </a:outerShdw>
+                </a:effectLst>
+              </a:rPr>
+              <a:t> </a:t>
+            </a:r>
+            <a:r>
+              <a:rPr lang="en-US" altLang="zh-TW" sz="2850" b="1" dirty="0" err="1">
+                <a:ln w="13462">
+                  <a:solidFill>
+                    <a:schemeClr val="bg1"/>
+                  </a:solidFill>
+                  <a:prstDash val="solid"/>
+                </a:ln>
+                <a:solidFill>
+                  <a:schemeClr val="tx1">
+                    <a:lumMod val="85000"/>
+                    <a:lumOff val="15000"/>
+                  </a:schemeClr>
+                </a:solidFill>
+                <a:effectLst>
+                  <a:outerShdw dist="38100" dir="2700000" algn="bl" rotWithShape="0">
+                    <a:schemeClr val="accent5"/>
+                  </a:outerShdw>
+                </a:effectLst>
+              </a:rPr>
+              <a:t>nae</a:t>
+            </a:r>
+            <a:r>
+              <a:rPr lang="en-US" altLang="zh-TW" sz="2850" b="1" dirty="0">
+                <a:ln w="13462">
+                  <a:solidFill>
+                    <a:schemeClr val="bg1"/>
+                  </a:solidFill>
+                  <a:prstDash val="solid"/>
+                </a:ln>
+                <a:solidFill>
+                  <a:schemeClr val="tx1">
+                    <a:lumMod val="85000"/>
+                    <a:lumOff val="15000"/>
+                  </a:schemeClr>
+                </a:solidFill>
+                <a:effectLst>
+                  <a:outerShdw dist="38100" dir="2700000" algn="bl" rotWithShape="0">
+                    <a:schemeClr val="accent5"/>
+                  </a:outerShdw>
+                </a:effectLst>
+              </a:rPr>
+              <a:t> (Want me do it?)</a:t>
+            </a:r>
+            <a:endParaRPr lang="zh-TW" altLang="en-US" sz="2850" b="1" dirty="0">
+              <a:ln w="13462">
+                <a:solidFill>
+                  <a:schemeClr val="bg1"/>
+                </a:solidFill>
+                <a:prstDash val="solid"/>
+              </a:ln>
+              <a:solidFill>
+                <a:schemeClr val="tx1">
+                  <a:lumMod val="85000"/>
+                  <a:lumOff val="15000"/>
+                </a:schemeClr>
+              </a:solidFill>
+              <a:effectLst>
+                <a:outerShdw dist="38100" dir="2700000" algn="bl" rotWithShape="0">
+                  <a:schemeClr val="accent5"/>
+                </a:outerShdw>
+              </a:effectLst>
+            </a:endParaRPr>
+          </a:p>
+          <a:p>
+            <a:pPr algn="ctr"/>
+            <a:endParaRPr lang="zh-TW" altLang="en-US" sz="2500" dirty="0"/>
+          </a:p>
+        </p:txBody>
+      </p:sp>
+      <p:sp>
+        <p:nvSpPr>
+          <p:cNvPr id="5" name="投影片編號版面配置區 4">
+            <a:extLst>
+              <a:ext uri="{FF2B5EF4-FFF2-40B4-BE49-F238E27FC236}">
+                <a16:creationId xmlns:a16="http://schemas.microsoft.com/office/drawing/2014/main" id="{90B738B4-5F25-4308-ACF0-F227777CE146}"/>
+              </a:ext>
+            </a:extLst>
+          </p:cNvPr>
+          <p:cNvSpPr>
+            <a:spLocks noGrp="1"/>
+          </p:cNvSpPr>
+          <p:nvPr>
+            <p:ph type="sldNum" sz="quarter" idx="12"/>
+          </p:nvPr>
+        </p:nvSpPr>
+        <p:spPr/>
+        <p:txBody>
+          <a:bodyPr/>
+          <a:lstStyle/>
+          <a:p>
+            <a:fld id="{185D6EED-6655-410A-86B1-950460054D05}" type="slidenum">
+              <a:rPr lang="zh-TW" altLang="en-US" smtClean="0"/>
+              <a:t>3</a:t>
+            </a:fld>
+            <a:r>
+              <a:rPr lang="en-US" altLang="zh-TW" dirty="0"/>
+              <a:t>/7</a:t>
+            </a:r>
+            <a:endParaRPr lang="zh-TW" altLang="en-US" dirty="0"/>
+          </a:p>
+        </p:txBody>
+      </p:sp>
+    </p:spTree>
+    <p:extLst>
+      <p:ext uri="{BB962C8B-B14F-4D97-AF65-F5344CB8AC3E}">
+        <p14:creationId xmlns:p14="http://schemas.microsoft.com/office/powerpoint/2010/main" val="2193657244"/>
+      </p:ext>
+    </p:extLst>
+  </p:cSld>
+  <p:clrMapOvr>
+    <a:masterClrMapping/>
+  </p:clrMapOvr>
+  <mc:AlternateContent xmlns:mc="http://schemas.openxmlformats.org/markup-compatibility/2006">
+    <mc:Choice xmlns:p14="http://schemas.microsoft.com/office/powerpoint/2010/main" Requires="p14">
+      <p:transition spd="slow" p14:dur="1500">
+        <p:split orient="vert"/>
+      </p:transition>
+    </mc:Choice>
+    <mc:Fallback>
+      <p:transition spd="slow">
+        <p:split orient="vert"/>
+      </p:transition>
+    </mc:Fallback>
+  </mc:AlternateContent>
+  <p:timing>
+    <p:tnLst>
+      <p:par>
+        <p:cTn id="1" dur="indefinite" restart="never" nodeType="tmRoot">
+          <p:childTnLst>
+            <p:seq concurrent="1" nextAc="seek">
+              <p:cTn id="2" dur="indefinite" nodeType="mainSeq">
+                <p:childTnLst>
+                  <p:par>
+                    <p:cTn id="3" fill="hold">
+                      <p:stCondLst>
+                        <p:cond delay="indefinite"/>
+                      </p:stCondLst>
+                      <p:childTnLst>
+                        <p:par>
+                          <p:cTn id="4" fill="hold">
+                            <p:stCondLst>
+                              <p:cond delay="0"/>
+                            </p:stCondLst>
+                            <p:childTnLst>
+                              <p:par>
+                                <p:cTn id="5" presetID="10" presetClass="entr" presetSubtype="0" fill="hold" grpId="0" nodeType="clickEffect">
+                                  <p:stCondLst>
+                                    <p:cond delay="0"/>
+                                  </p:stCondLst>
+                                  <p:childTnLst>
+                                    <p:set>
+                                      <p:cBhvr>
+                                        <p:cTn id="6" dur="1" fill="hold">
+                                          <p:stCondLst>
+                                            <p:cond delay="0"/>
+                                          </p:stCondLst>
+                                        </p:cTn>
+                                        <p:tgtEl>
+                                          <p:spTgt spid="3">
+                                            <p:txEl>
+                                              <p:pRg st="0" end="0"/>
+                                            </p:txEl>
+                                          </p:spTgt>
+                                        </p:tgtEl>
+                                        <p:attrNameLst>
+                                          <p:attrName>style.visibility</p:attrName>
+                                        </p:attrNameLst>
+                                      </p:cBhvr>
+                                      <p:to>
+                                        <p:strVal val="visible"/>
+                                      </p:to>
+                                    </p:set>
+                                    <p:animEffect transition="in" filter="fade">
+                                      <p:cBhvr>
+                                        <p:cTn id="7" dur="500"/>
+                                        <p:tgtEl>
+                                          <p:spTgt spid="3">
+                                            <p:txEl>
+                                              <p:pRg st="0" end="0"/>
+                                            </p:txEl>
+                                          </p:spTgt>
+                                        </p:tgtEl>
+                                      </p:cBhvr>
+                                    </p:animEffect>
+                                  </p:childTnLst>
+                                </p:cTn>
+                              </p:par>
+                            </p:childTnLst>
+                          </p:cTn>
+                        </p:par>
+                      </p:childTnLst>
+                    </p:cTn>
+                  </p:par>
+                  <p:par>
+                    <p:cTn id="8" fill="hold">
+                      <p:stCondLst>
+                        <p:cond delay="indefinite"/>
+                      </p:stCondLst>
+                      <p:childTnLst>
+                        <p:par>
+                          <p:cTn id="9" fill="hold">
+                            <p:stCondLst>
+                              <p:cond delay="0"/>
+                            </p:stCondLst>
+                            <p:childTnLst>
+                              <p:par>
+                                <p:cTn id="10" presetID="10" presetClass="entr" presetSubtype="0" fill="hold" grpId="0" nodeType="clickEffect">
+                                  <p:stCondLst>
+                                    <p:cond delay="0"/>
+                                  </p:stCondLst>
+                                  <p:childTnLst>
+                                    <p:set>
+                                      <p:cBhvr>
+                                        <p:cTn id="11" dur="1" fill="hold">
+                                          <p:stCondLst>
+                                            <p:cond delay="0"/>
+                                          </p:stCondLst>
+                                        </p:cTn>
+                                        <p:tgtEl>
+                                          <p:spTgt spid="3">
+                                            <p:txEl>
+                                              <p:pRg st="1" end="1"/>
+                                            </p:txEl>
+                                          </p:spTgt>
+                                        </p:tgtEl>
+                                        <p:attrNameLst>
+                                          <p:attrName>style.visibility</p:attrName>
+                                        </p:attrNameLst>
+                                      </p:cBhvr>
+                                      <p:to>
+                                        <p:strVal val="visible"/>
+                                      </p:to>
+                                    </p:set>
+                                    <p:animEffect transition="in" filter="fade">
+                                      <p:cBhvr>
+                                        <p:cTn id="12" dur="500"/>
+                                        <p:tgtEl>
+                                          <p:spTgt spid="3">
+                                            <p:txEl>
+                                              <p:pRg st="1" end="1"/>
+                                            </p:txEl>
+                                          </p:spTgt>
+                                        </p:tgtEl>
+                                      </p:cBhvr>
+                                    </p:animEffect>
+                                  </p:childTnLst>
+                                </p:cTn>
+                              </p:par>
+                            </p:childTnLst>
+                          </p:cTn>
+                        </p:par>
+                      </p:childTnLst>
+                    </p:cTn>
+                  </p:par>
+                  <p:par>
+                    <p:cTn id="13" fill="hold">
+                      <p:stCondLst>
+                        <p:cond delay="indefinite"/>
+                      </p:stCondLst>
+                      <p:childTnLst>
+                        <p:par>
+                          <p:cTn id="14" fill="hold">
+                            <p:stCondLst>
+                              <p:cond delay="0"/>
+                            </p:stCondLst>
+                            <p:childTnLst>
+                              <p:par>
+                                <p:cTn id="15" presetID="14" presetClass="entr" presetSubtype="10" fill="hold" nodeType="clickEffect">
+                                  <p:stCondLst>
+                                    <p:cond delay="0"/>
+                                  </p:stCondLst>
+                                  <p:childTnLst>
+                                    <p:set>
+                                      <p:cBhvr>
+                                        <p:cTn id="16" dur="1" fill="hold">
+                                          <p:stCondLst>
+                                            <p:cond delay="0"/>
+                                          </p:stCondLst>
+                                        </p:cTn>
+                                        <p:tgtEl>
+                                          <p:spTgt spid="4"/>
+                                        </p:tgtEl>
+                                        <p:attrNameLst>
+                                          <p:attrName>style.visibility</p:attrName>
+                                        </p:attrNameLst>
+                                      </p:cBhvr>
+                                      <p:to>
+                                        <p:strVal val="visible"/>
+                                      </p:to>
+                                    </p:set>
+                                    <p:animEffect transition="in" filter="randombar(horizontal)">
+                                      <p:cBhvr>
+                                        <p:cTn id="17" dur="500"/>
+                                        <p:tgtEl>
+                                          <p:spTgt spid="4"/>
+                                        </p:tgtEl>
+                                      </p:cBhvr>
+                                    </p:animEffect>
+                                  </p:childTnLst>
+                                </p:cTn>
+                              </p:par>
+                            </p:childTnLst>
+                          </p:cTn>
+                        </p:par>
+                      </p:childTnLst>
+                    </p:cTn>
+                  </p:par>
+                  <p:par>
+                    <p:cTn id="18" fill="hold">
+                      <p:stCondLst>
+                        <p:cond delay="indefinite"/>
+                      </p:stCondLst>
+                      <p:childTnLst>
+                        <p:par>
+                          <p:cTn id="19" fill="hold">
+                            <p:stCondLst>
+                              <p:cond delay="0"/>
+                            </p:stCondLst>
+                            <p:childTnLst>
+                              <p:par>
+                                <p:cTn id="20" presetID="42" presetClass="entr" presetSubtype="0" fill="hold" grpId="0" nodeType="clickEffect">
+                                  <p:stCondLst>
+                                    <p:cond delay="0"/>
+                                  </p:stCondLst>
+                                  <p:childTnLst>
+                                    <p:set>
+                                      <p:cBhvr>
+                                        <p:cTn id="21" dur="1" fill="hold">
                                           <p:stCondLst>
                                             <p:cond delay="0"/>
                                           </p:stCondLst>
@@ -7184,7 +7989,7 @@
                                     </p:set>
                                     <p:animEffect transition="in" filter="fade">
                                       <p:cBhvr>
-                                        <p:cTn id="7" dur="1000"/>
+                                        <p:cTn id="22" dur="1000"/>
                                         <p:tgtEl>
                                           <p:spTgt spid="6"/>
                                         </p:tgtEl>
@@ -7192,7 +7997,7 @@
                                     </p:animEffect>
                                     <p:anim calcmode="lin" valueType="num">
                                       <p:cBhvr>
-                                        <p:cTn id="8" dur="1000" fill="hold"/>
+                                        <p:cTn id="23" dur="1000" fill="hold"/>
                                         <p:tgtEl>
                                           <p:spTgt spid="6"/>
                                         </p:tgtEl>
@@ -7215,7 +8020,7 @@
                                     </p:anim>
                                     <p:anim calcmode="lin" valueType="num">
                                       <p:cBhvr>
-                                        <p:cTn id="9" dur="1000" fill="hold"/>
+                                        <p:cTn id="24" dur="1000" fill="hold"/>
                                         <p:tgtEl>
                                           <p:spTgt spid="6"/>
                                         </p:tgtEl>
@@ -7267,13 +8072,14 @@
       </p:par>
     </p:tnLst>
     <p:bldLst>
+      <p:bldP spid="3" grpId="0" build="p"/>
       <p:bldP spid="6" grpId="0" animBg="1"/>
     </p:bldLst>
   </p:timing>
 </p:sld>
 </file>
 
-<file path=ppt/slides/slide5.xml><?xml version="1.0" encoding="utf-8"?>
+<file path=ppt/slides/slide4.xml><?xml version="1.0" encoding="utf-8"?>
 <p:sld xmlns:a="http://schemas.openxmlformats.org/drawingml/2006/main" xmlns:r="http://schemas.openxmlformats.org/officeDocument/2006/relationships" xmlns:p="http://schemas.openxmlformats.org/presentationml/2006/main">
   <p:cSld>
     <p:spTree>
@@ -7306,16 +8112,8 @@
           <a:lstStyle/>
           <a:p>
             <a:r>
-              <a:rPr lang="en-US" altLang="zh-TW" dirty="0" smtClean="0"/>
-              <a:t>Put Your </a:t>
-            </a:r>
-            <a:r>
-              <a:rPr lang="en-US" altLang="zh-TW" dirty="0" err="1" smtClean="0"/>
-              <a:t>Instrutment</a:t>
-            </a:r>
-            <a:r>
-              <a:rPr lang="en-US" altLang="zh-TW" dirty="0" smtClean="0"/>
-              <a:t> Down!</a:t>
+              <a:rPr lang="en-US" altLang="zh-TW" dirty="0"/>
+              <a:t>Put Your Instruments Down!</a:t>
             </a:r>
             <a:endParaRPr lang="zh-TW" altLang="en-US" dirty="0"/>
           </a:p>
@@ -7337,22 +8135,14 @@
           <a:lstStyle/>
           <a:p>
             <a:r>
-              <a:rPr lang="en-US" altLang="zh-TW" dirty="0" smtClean="0"/>
+              <a:rPr lang="en-US" altLang="zh-TW" dirty="0"/>
               <a:t>Using a music arrangement software.</a:t>
             </a:r>
           </a:p>
           <a:p>
             <a:r>
-              <a:rPr lang="en-US" altLang="zh-TW" dirty="0" smtClean="0"/>
-              <a:t>Based on how familiar with those </a:t>
-            </a:r>
-            <a:r>
-              <a:rPr lang="en-US" altLang="zh-TW" dirty="0" err="1" smtClean="0"/>
-              <a:t>instrutment</a:t>
-            </a:r>
-            <a:r>
               <a:rPr lang="en-US" altLang="zh-TW" dirty="0"/>
-              <a:t>.</a:t>
+              <a:t>Based on how familiar with those Instruments.</a:t>
             </a:r>
             <a:endParaRPr lang="zh-TW" altLang="en-US" dirty="0"/>
           </a:p>
@@ -7382,6 +8172,39 @@
           </a:prstGeom>
         </p:spPr>
       </p:pic>
+      <p:sp>
+        <p:nvSpPr>
+          <p:cNvPr id="4" name="投影片編號版面配置區 3">
+            <a:extLst>
+              <a:ext uri="{FF2B5EF4-FFF2-40B4-BE49-F238E27FC236}">
+                <a16:creationId xmlns:a16="http://schemas.microsoft.com/office/drawing/2014/main" id="{D3767AF1-9D35-4D9F-BBF5-C9272418F837}"/>
+              </a:ext>
+            </a:extLst>
+          </p:cNvPr>
+          <p:cNvSpPr>
+            <a:spLocks noGrp="1"/>
+          </p:cNvSpPr>
+          <p:nvPr>
+            <p:ph type="sldNum" sz="quarter" idx="12"/>
+          </p:nvPr>
+        </p:nvSpPr>
+        <p:spPr/>
+        <p:txBody>
+          <a:bodyPr/>
+          <a:lstStyle/>
+          <a:p>
+            <a:fld id="{185D6EED-6655-410A-86B1-950460054D05}" type="slidenum">
+              <a:rPr lang="zh-TW" altLang="en-US" smtClean="0"/>
+              <a:t>4</a:t>
+            </a:fld>
+            <a:r>
+              <a:rPr lang="en-US" altLang="zh-TW" dirty="0"/>
+              <a:t>/7</a:t>
+            </a:r>
+            <a:endParaRPr lang="zh-TW" altLang="en-US" dirty="0"/>
+          </a:p>
+        </p:txBody>
+      </p:sp>
     </p:spTree>
     <p:extLst>
       <p:ext uri="{BB962C8B-B14F-4D97-AF65-F5344CB8AC3E}">
@@ -7392,13 +8215,367 @@
   <p:clrMapOvr>
     <a:masterClrMapping/>
   </p:clrMapOvr>
+  <mc:AlternateContent xmlns:mc="http://schemas.openxmlformats.org/markup-compatibility/2006">
+    <mc:Choice xmlns:p14="http://schemas.microsoft.com/office/powerpoint/2010/main" Requires="p14">
+      <p:transition spd="slow" p14:dur="1500">
+        <p:split orient="vert"/>
+      </p:transition>
+    </mc:Choice>
+    <mc:Fallback>
+      <p:transition spd="slow">
+        <p:split orient="vert"/>
+      </p:transition>
+    </mc:Fallback>
+  </mc:AlternateContent>
   <p:timing>
     <p:tnLst>
       <p:par>
-        <p:cTn id="1" dur="indefinite" restart="never" nodeType="tmRoot"/>
+        <p:cTn id="1" dur="indefinite" restart="never" nodeType="tmRoot">
+          <p:childTnLst>
+            <p:seq concurrent="1" nextAc="seek">
+              <p:cTn id="2" dur="indefinite" nodeType="mainSeq">
+                <p:childTnLst>
+                  <p:par>
+                    <p:cTn id="3" fill="hold">
+                      <p:stCondLst>
+                        <p:cond delay="indefinite"/>
+                      </p:stCondLst>
+                      <p:childTnLst>
+                        <p:par>
+                          <p:cTn id="4" fill="hold">
+                            <p:stCondLst>
+                              <p:cond delay="0"/>
+                            </p:stCondLst>
+                            <p:childTnLst>
+                              <p:par>
+                                <p:cTn id="5" presetID="10" presetClass="entr" presetSubtype="0" fill="hold" grpId="0" nodeType="clickEffect">
+                                  <p:stCondLst>
+                                    <p:cond delay="0"/>
+                                  </p:stCondLst>
+                                  <p:childTnLst>
+                                    <p:set>
+                                      <p:cBhvr>
+                                        <p:cTn id="6" dur="1" fill="hold">
+                                          <p:stCondLst>
+                                            <p:cond delay="0"/>
+                                          </p:stCondLst>
+                                        </p:cTn>
+                                        <p:tgtEl>
+                                          <p:spTgt spid="3">
+                                            <p:txEl>
+                                              <p:pRg st="0" end="0"/>
+                                            </p:txEl>
+                                          </p:spTgt>
+                                        </p:tgtEl>
+                                        <p:attrNameLst>
+                                          <p:attrName>style.visibility</p:attrName>
+                                        </p:attrNameLst>
+                                      </p:cBhvr>
+                                      <p:to>
+                                        <p:strVal val="visible"/>
+                                      </p:to>
+                                    </p:set>
+                                    <p:animEffect transition="in" filter="fade">
+                                      <p:cBhvr>
+                                        <p:cTn id="7" dur="500"/>
+                                        <p:tgtEl>
+                                          <p:spTgt spid="3">
+                                            <p:txEl>
+                                              <p:pRg st="0" end="0"/>
+                                            </p:txEl>
+                                          </p:spTgt>
+                                        </p:tgtEl>
+                                      </p:cBhvr>
+                                    </p:animEffect>
+                                  </p:childTnLst>
+                                </p:cTn>
+                              </p:par>
+                            </p:childTnLst>
+                          </p:cTn>
+                        </p:par>
+                      </p:childTnLst>
+                    </p:cTn>
+                  </p:par>
+                  <p:par>
+                    <p:cTn id="8" fill="hold">
+                      <p:stCondLst>
+                        <p:cond delay="indefinite"/>
+                      </p:stCondLst>
+                      <p:childTnLst>
+                        <p:par>
+                          <p:cTn id="9" fill="hold">
+                            <p:stCondLst>
+                              <p:cond delay="0"/>
+                            </p:stCondLst>
+                            <p:childTnLst>
+                              <p:par>
+                                <p:cTn id="10" presetID="10" presetClass="entr" presetSubtype="0" fill="hold" grpId="0" nodeType="clickEffect">
+                                  <p:stCondLst>
+                                    <p:cond delay="0"/>
+                                  </p:stCondLst>
+                                  <p:childTnLst>
+                                    <p:set>
+                                      <p:cBhvr>
+                                        <p:cTn id="11" dur="1" fill="hold">
+                                          <p:stCondLst>
+                                            <p:cond delay="0"/>
+                                          </p:stCondLst>
+                                        </p:cTn>
+                                        <p:tgtEl>
+                                          <p:spTgt spid="3">
+                                            <p:txEl>
+                                              <p:pRg st="1" end="1"/>
+                                            </p:txEl>
+                                          </p:spTgt>
+                                        </p:tgtEl>
+                                        <p:attrNameLst>
+                                          <p:attrName>style.visibility</p:attrName>
+                                        </p:attrNameLst>
+                                      </p:cBhvr>
+                                      <p:to>
+                                        <p:strVal val="visible"/>
+                                      </p:to>
+                                    </p:set>
+                                    <p:animEffect transition="in" filter="fade">
+                                      <p:cBhvr>
+                                        <p:cTn id="12" dur="500"/>
+                                        <p:tgtEl>
+                                          <p:spTgt spid="3">
+                                            <p:txEl>
+                                              <p:pRg st="1" end="1"/>
+                                            </p:txEl>
+                                          </p:spTgt>
+                                        </p:tgtEl>
+                                      </p:cBhvr>
+                                    </p:animEffect>
+                                  </p:childTnLst>
+                                </p:cTn>
+                              </p:par>
+                            </p:childTnLst>
+                          </p:cTn>
+                        </p:par>
+                      </p:childTnLst>
+                    </p:cTn>
+                  </p:par>
+                  <p:par>
+                    <p:cTn id="13" fill="hold">
+                      <p:stCondLst>
+                        <p:cond delay="indefinite"/>
+                      </p:stCondLst>
+                      <p:childTnLst>
+                        <p:par>
+                          <p:cTn id="14" fill="hold">
+                            <p:stCondLst>
+                              <p:cond delay="0"/>
+                            </p:stCondLst>
+                            <p:childTnLst>
+                              <p:par>
+                                <p:cTn id="15" presetID="2" presetClass="entr" presetSubtype="2" fill="hold" nodeType="clickEffect">
+                                  <p:stCondLst>
+                                    <p:cond delay="0"/>
+                                  </p:stCondLst>
+                                  <p:childTnLst>
+                                    <p:set>
+                                      <p:cBhvr>
+                                        <p:cTn id="16" dur="1" fill="hold">
+                                          <p:stCondLst>
+                                            <p:cond delay="0"/>
+                                          </p:stCondLst>
+                                        </p:cTn>
+                                        <p:tgtEl>
+                                          <p:spTgt spid="5"/>
+                                        </p:tgtEl>
+                                        <p:attrNameLst>
+                                          <p:attrName>style.visibility</p:attrName>
+                                        </p:attrNameLst>
+                                      </p:cBhvr>
+                                      <p:to>
+                                        <p:strVal val="visible"/>
+                                      </p:to>
+                                    </p:set>
+                                    <p:anim calcmode="lin" valueType="num">
+                                      <p:cBhvr additive="base">
+                                        <p:cTn id="17" dur="500" fill="hold"/>
+                                        <p:tgtEl>
+                                          <p:spTgt spid="5"/>
+                                        </p:tgtEl>
+                                        <p:attrNameLst>
+                                          <p:attrName>ppt_x</p:attrName>
+                                        </p:attrNameLst>
+                                      </p:cBhvr>
+                                      <p:tavLst>
+                                        <p:tav tm="0">
+                                          <p:val>
+                                            <p:strVal val="1+#ppt_w/2"/>
+                                          </p:val>
+                                        </p:tav>
+                                        <p:tav tm="100000">
+                                          <p:val>
+                                            <p:strVal val="#ppt_x"/>
+                                          </p:val>
+                                        </p:tav>
+                                      </p:tavLst>
+                                    </p:anim>
+                                    <p:anim calcmode="lin" valueType="num">
+                                      <p:cBhvr additive="base">
+                                        <p:cTn id="18" dur="500" fill="hold"/>
+                                        <p:tgtEl>
+                                          <p:spTgt spid="5"/>
+                                        </p:tgtEl>
+                                        <p:attrNameLst>
+                                          <p:attrName>ppt_y</p:attrName>
+                                        </p:attrNameLst>
+                                      </p:cBhvr>
+                                      <p:tavLst>
+                                        <p:tav tm="0">
+                                          <p:val>
+                                            <p:strVal val="#ppt_y"/>
+                                          </p:val>
+                                        </p:tav>
+                                        <p:tav tm="100000">
+                                          <p:val>
+                                            <p:strVal val="#ppt_y"/>
+                                          </p:val>
+                                        </p:tav>
+                                      </p:tavLst>
+                                    </p:anim>
+                                  </p:childTnLst>
+                                </p:cTn>
+                              </p:par>
+                            </p:childTnLst>
+                          </p:cTn>
+                        </p:par>
+                      </p:childTnLst>
+                    </p:cTn>
+                  </p:par>
+                </p:childTnLst>
+              </p:cTn>
+              <p:prevCondLst>
+                <p:cond evt="onPrev" delay="0">
+                  <p:tgtEl>
+                    <p:sldTgt/>
+                  </p:tgtEl>
+                </p:cond>
+              </p:prevCondLst>
+              <p:nextCondLst>
+                <p:cond evt="onNext" delay="0">
+                  <p:tgtEl>
+                    <p:sldTgt/>
+                  </p:tgtEl>
+                </p:cond>
+              </p:nextCondLst>
+            </p:seq>
+          </p:childTnLst>
+        </p:cTn>
       </p:par>
     </p:tnLst>
+    <p:bldLst>
+      <p:bldP spid="3" grpId="0" build="p"/>
+    </p:bldLst>
   </p:timing>
+</p:sld>
+</file>
+
+<file path=ppt/slides/slide5.xml><?xml version="1.0" encoding="utf-8"?>
+<p:sld xmlns:a="http://schemas.openxmlformats.org/drawingml/2006/main" xmlns:r="http://schemas.openxmlformats.org/officeDocument/2006/relationships" xmlns:p="http://schemas.openxmlformats.org/presentationml/2006/main">
+  <p:cSld>
+    <p:spTree>
+      <p:nvGrpSpPr>
+        <p:cNvPr id="1" name=""/>
+        <p:cNvGrpSpPr/>
+        <p:nvPr/>
+      </p:nvGrpSpPr>
+      <p:grpSpPr>
+        <a:xfrm>
+          <a:off x="0" y="0"/>
+          <a:ext cx="0" cy="0"/>
+          <a:chOff x="0" y="0"/>
+          <a:chExt cx="0" cy="0"/>
+        </a:xfrm>
+      </p:grpSpPr>
+      <p:sp>
+        <p:nvSpPr>
+          <p:cNvPr id="2" name="標題 1"/>
+          <p:cNvSpPr>
+            <a:spLocks noGrp="1"/>
+          </p:cNvSpPr>
+          <p:nvPr>
+            <p:ph type="ctrTitle"/>
+          </p:nvPr>
+        </p:nvSpPr>
+        <p:spPr>
+          <a:xfrm>
+            <a:off x="1983088" y="2277374"/>
+            <a:ext cx="8653281" cy="1464837"/>
+          </a:xfrm>
+        </p:spPr>
+        <p:txBody>
+          <a:bodyPr/>
+          <a:lstStyle/>
+          <a:p>
+            <a:r>
+              <a:rPr lang="en-US" altLang="zh-TW" sz="6600" b="1" dirty="0"/>
+              <a:t>Questioning Time!</a:t>
+            </a:r>
+            <a:endParaRPr lang="en-US" altLang="zh-TW" sz="6500" b="1" dirty="0"/>
+          </a:p>
+        </p:txBody>
+      </p:sp>
+      <p:sp>
+        <p:nvSpPr>
+          <p:cNvPr id="3" name="投影片編號版面配置區 2">
+            <a:extLst>
+              <a:ext uri="{FF2B5EF4-FFF2-40B4-BE49-F238E27FC236}">
+                <a16:creationId xmlns:a16="http://schemas.microsoft.com/office/drawing/2014/main" id="{82CAAD8F-875D-427D-AF0A-AE3A9BE2B732}"/>
+              </a:ext>
+            </a:extLst>
+          </p:cNvPr>
+          <p:cNvSpPr>
+            <a:spLocks noGrp="1"/>
+          </p:cNvSpPr>
+          <p:nvPr>
+            <p:ph type="sldNum" sz="quarter" idx="12"/>
+          </p:nvPr>
+        </p:nvSpPr>
+        <p:spPr/>
+        <p:txBody>
+          <a:bodyPr/>
+          <a:lstStyle/>
+          <a:p>
+            <a:fld id="{185D6EED-6655-410A-86B1-950460054D05}" type="slidenum">
+              <a:rPr lang="zh-TW" altLang="en-US" smtClean="0"/>
+              <a:t>5</a:t>
+            </a:fld>
+            <a:r>
+              <a:rPr lang="en-US" altLang="zh-TW" dirty="0"/>
+              <a:t>/7</a:t>
+            </a:r>
+            <a:endParaRPr lang="zh-TW" altLang="en-US" dirty="0"/>
+          </a:p>
+        </p:txBody>
+      </p:sp>
+    </p:spTree>
+    <p:extLst>
+      <p:ext uri="{BB962C8B-B14F-4D97-AF65-F5344CB8AC3E}">
+        <p14:creationId xmlns:p14="http://schemas.microsoft.com/office/powerpoint/2010/main" val="621527929"/>
+      </p:ext>
+    </p:extLst>
+  </p:cSld>
+  <p:clrMapOvr>
+    <a:masterClrMapping/>
+  </p:clrMapOvr>
+  <mc:AlternateContent xmlns:mc="http://schemas.openxmlformats.org/markup-compatibility/2006">
+    <mc:Choice xmlns:p14="http://schemas.microsoft.com/office/powerpoint/2010/main" Requires="p14">
+      <p:transition spd="slow" p14:dur="1500">
+        <p:split orient="vert"/>
+      </p:transition>
+    </mc:Choice>
+    <mc:Fallback>
+      <p:transition spd="slow">
+        <p:split orient="vert"/>
+      </p:transition>
+    </mc:Fallback>
+  </mc:AlternateContent>
 </p:sld>
 </file>
 
@@ -7431,71 +8608,6 @@
         </p:nvSpPr>
         <p:spPr>
           <a:xfrm>
-            <a:off x="1983088" y="2277374"/>
-            <a:ext cx="8653281" cy="1464837"/>
-          </a:xfrm>
-        </p:spPr>
-        <p:txBody>
-          <a:bodyPr/>
-          <a:lstStyle/>
-          <a:p>
-            <a:r>
-              <a:rPr lang="en-US" altLang="zh-TW" sz="6600" dirty="0"/>
-              <a:t>Questioning Time!</a:t>
-            </a:r>
-            <a:endParaRPr lang="en-US" altLang="zh-TW" sz="6500" b="1" dirty="0"/>
-          </a:p>
-        </p:txBody>
-      </p:sp>
-    </p:spTree>
-    <p:extLst>
-      <p:ext uri="{BB962C8B-B14F-4D97-AF65-F5344CB8AC3E}">
-        <p14:creationId xmlns:p14="http://schemas.microsoft.com/office/powerpoint/2010/main" val="621527929"/>
-      </p:ext>
-    </p:extLst>
-  </p:cSld>
-  <p:clrMapOvr>
-    <a:masterClrMapping/>
-  </p:clrMapOvr>
-  <p:timing>
-    <p:tnLst>
-      <p:par>
-        <p:cTn id="1" dur="indefinite" restart="never" nodeType="tmRoot"/>
-      </p:par>
-    </p:tnLst>
-  </p:timing>
-</p:sld>
-</file>
-
-<file path=ppt/slides/slide7.xml><?xml version="1.0" encoding="utf-8"?>
-<p:sld xmlns:a="http://schemas.openxmlformats.org/drawingml/2006/main" xmlns:r="http://schemas.openxmlformats.org/officeDocument/2006/relationships" xmlns:p="http://schemas.openxmlformats.org/presentationml/2006/main">
-  <p:cSld>
-    <p:spTree>
-      <p:nvGrpSpPr>
-        <p:cNvPr id="1" name=""/>
-        <p:cNvGrpSpPr/>
-        <p:nvPr/>
-      </p:nvGrpSpPr>
-      <p:grpSpPr>
-        <a:xfrm>
-          <a:off x="0" y="0"/>
-          <a:ext cx="0" cy="0"/>
-          <a:chOff x="0" y="0"/>
-          <a:chExt cx="0" cy="0"/>
-        </a:xfrm>
-      </p:grpSpPr>
-      <p:sp>
-        <p:nvSpPr>
-          <p:cNvPr id="2" name="標題 1"/>
-          <p:cNvSpPr>
-            <a:spLocks noGrp="1"/>
-          </p:cNvSpPr>
-          <p:nvPr>
-            <p:ph type="ctrTitle"/>
-          </p:nvPr>
-        </p:nvSpPr>
-        <p:spPr>
-          <a:xfrm>
             <a:off x="1732922" y="2286000"/>
             <a:ext cx="9265757" cy="1464837"/>
           </a:xfrm>
@@ -7505,18 +8617,50 @@
           <a:lstStyle/>
           <a:p>
             <a:r>
-              <a:rPr lang="en-US" altLang="zh-TW" sz="6500" b="1" dirty="0" smtClean="0"/>
+              <a:rPr lang="en-US" altLang="zh-TW" sz="6500" b="1" dirty="0"/>
               <a:t>Thanks for </a:t>
             </a:r>
             <a:r>
-              <a:rPr lang="en-US" altLang="zh-TW" sz="6500" b="1" dirty="0" err="1" smtClean="0"/>
+              <a:rPr lang="en-US" altLang="zh-TW" sz="6500" b="1" dirty="0" err="1"/>
               <a:t>listenening</a:t>
             </a:r>
             <a:r>
-              <a:rPr lang="en-US" altLang="zh-TW" sz="6500" b="1" dirty="0" smtClean="0"/>
+              <a:rPr lang="en-US" altLang="zh-TW" sz="6500" b="1" dirty="0"/>
               <a:t>!</a:t>
             </a:r>
-            <a:endParaRPr lang="en-US" altLang="zh-TW" sz="6500" b="1" dirty="0"/>
+          </a:p>
+        </p:txBody>
+      </p:sp>
+      <p:sp>
+        <p:nvSpPr>
+          <p:cNvPr id="3" name="投影片編號版面配置區 2">
+            <a:extLst>
+              <a:ext uri="{FF2B5EF4-FFF2-40B4-BE49-F238E27FC236}">
+                <a16:creationId xmlns:a16="http://schemas.microsoft.com/office/drawing/2014/main" id="{EB123727-2A40-412A-9F40-35B7458009B5}"/>
+              </a:ext>
+            </a:extLst>
+          </p:cNvPr>
+          <p:cNvSpPr>
+            <a:spLocks noGrp="1"/>
+          </p:cNvSpPr>
+          <p:nvPr>
+            <p:ph type="sldNum" sz="quarter" idx="12"/>
+          </p:nvPr>
+        </p:nvSpPr>
+        <p:spPr/>
+        <p:txBody>
+          <a:bodyPr/>
+          <a:lstStyle/>
+          <a:p>
+            <a:fld id="{185D6EED-6655-410A-86B1-950460054D05}" type="slidenum">
+              <a:rPr lang="zh-TW" altLang="en-US" smtClean="0"/>
+              <a:t>6</a:t>
+            </a:fld>
+            <a:r>
+              <a:rPr lang="en-US" altLang="zh-TW" dirty="0"/>
+              <a:t>/7</a:t>
+            </a:r>
+            <a:endParaRPr lang="zh-TW" altLang="en-US" dirty="0"/>
           </a:p>
         </p:txBody>
       </p:sp>
@@ -7530,6 +8674,18 @@
   <p:clrMapOvr>
     <a:masterClrMapping/>
   </p:clrMapOvr>
+  <mc:AlternateContent xmlns:mc="http://schemas.openxmlformats.org/markup-compatibility/2006">
+    <mc:Choice xmlns:p14="http://schemas.microsoft.com/office/powerpoint/2010/main" Requires="p14">
+      <p:transition spd="slow" p14:dur="1500">
+        <p:split orient="vert"/>
+      </p:transition>
+    </mc:Choice>
+    <mc:Fallback>
+      <p:transition spd="slow">
+        <p:split orient="vert"/>
+      </p:transition>
+    </mc:Fallback>
+  </mc:AlternateContent>
 </p:sld>
 </file>
 
@@ -7797,4 +8953,299 @@
     </a:ext>
   </a:extLst>
 </a:theme>
+</file>
+
+<file path=ppt/theme/theme2.xml><?xml version="1.0" encoding="utf-8"?>
+<a:theme xmlns:a="http://schemas.openxmlformats.org/drawingml/2006/main" name="Office 佈景主題">
+  <a:themeElements>
+    <a:clrScheme name="Office">
+      <a:dk1>
+        <a:sysClr val="windowText" lastClr="000000"/>
+      </a:dk1>
+      <a:lt1>
+        <a:sysClr val="window" lastClr="FFFFFF"/>
+      </a:lt1>
+      <a:dk2>
+        <a:srgbClr val="44546A"/>
+      </a:dk2>
+      <a:lt2>
+        <a:srgbClr val="E7E6E6"/>
+      </a:lt2>
+      <a:accent1>
+        <a:srgbClr val="4472C4"/>
+      </a:accent1>
+      <a:accent2>
+        <a:srgbClr val="ED7D31"/>
+      </a:accent2>
+      <a:accent3>
+        <a:srgbClr val="A5A5A5"/>
+      </a:accent3>
+      <a:accent4>
+        <a:srgbClr val="FFC000"/>
+      </a:accent4>
+      <a:accent5>
+        <a:srgbClr val="5B9BD5"/>
+      </a:accent5>
+      <a:accent6>
+        <a:srgbClr val="70AD47"/>
+      </a:accent6>
+      <a:hlink>
+        <a:srgbClr val="0563C1"/>
+      </a:hlink>
+      <a:folHlink>
+        <a:srgbClr val="954F72"/>
+      </a:folHlink>
+    </a:clrScheme>
+    <a:fontScheme name="Office">
+      <a:majorFont>
+        <a:latin typeface="Calibri Light" panose="020F0302020204030204"/>
+        <a:ea typeface=""/>
+        <a:cs typeface=""/>
+        <a:font script="Jpan" typeface="游ゴシック Light"/>
+        <a:font script="Hang" typeface="맑은 고딕"/>
+        <a:font script="Hans" typeface="等线 Light"/>
+        <a:font script="Hant" typeface="新細明體"/>
+        <a:font script="Arab" typeface="Times New Roman"/>
+        <a:font script="Hebr" typeface="Times New Roman"/>
+        <a:font script="Thai" typeface="Angsana New"/>
+        <a:font script="Ethi" typeface="Nyala"/>
+        <a:font script="Beng" typeface="Vrinda"/>
+        <a:font script="Gujr" typeface="Shruti"/>
+        <a:font script="Khmr" typeface="MoolBoran"/>
+        <a:font script="Knda" typeface="Tunga"/>
+        <a:font script="Guru" typeface="Raavi"/>
+        <a:font script="Cans" typeface="Euphemia"/>
+        <a:font script="Cher" typeface="Plantagenet Cherokee"/>
+        <a:font script="Yiii" typeface="Microsoft Yi Baiti"/>
+        <a:font script="Tibt" typeface="Microsoft Himalaya"/>
+        <a:font script="Thaa" typeface="MV Boli"/>
+        <a:font script="Deva" typeface="Mangal"/>
+        <a:font script="Telu" typeface="Gautami"/>
+        <a:font script="Taml" typeface="Latha"/>
+        <a:font script="Syrc" typeface="Estrangelo Edessa"/>
+        <a:font script="Orya" typeface="Kalinga"/>
+        <a:font script="Mlym" typeface="Kartika"/>
+        <a:font script="Laoo" typeface="DokChampa"/>
+        <a:font script="Sinh" typeface="Iskoola Pota"/>
+        <a:font script="Mong" typeface="Mongolian Baiti"/>
+        <a:font script="Viet" typeface="Times New Roman"/>
+        <a:font script="Uigh" typeface="Microsoft Uighur"/>
+        <a:font script="Geor" typeface="Sylfaen"/>
+        <a:font script="Armn" typeface="Arial"/>
+        <a:font script="Bugi" typeface="Leelawadee UI"/>
+        <a:font script="Bopo" typeface="Microsoft JhengHei"/>
+        <a:font script="Java" typeface="Javanese Text"/>
+        <a:font script="Lisu" typeface="Segoe UI"/>
+        <a:font script="Mymr" typeface="Myanmar Text"/>
+        <a:font script="Nkoo" typeface="Ebrima"/>
+        <a:font script="Olck" typeface="Nirmala UI"/>
+        <a:font script="Osma" typeface="Ebrima"/>
+        <a:font script="Phag" typeface="Phagspa"/>
+        <a:font script="Syrn" typeface="Estrangelo Edessa"/>
+        <a:font script="Syrj" typeface="Estrangelo Edessa"/>
+        <a:font script="Syre" typeface="Estrangelo Edessa"/>
+        <a:font script="Sora" typeface="Nirmala UI"/>
+        <a:font script="Tale" typeface="Microsoft Tai Le"/>
+        <a:font script="Talu" typeface="Microsoft New Tai Lue"/>
+        <a:font script="Tfng" typeface="Ebrima"/>
+      </a:majorFont>
+      <a:minorFont>
+        <a:latin typeface="Calibri" panose="020F0502020204030204"/>
+        <a:ea typeface=""/>
+        <a:cs typeface=""/>
+        <a:font script="Jpan" typeface="游ゴシック"/>
+        <a:font script="Hang" typeface="맑은 고딕"/>
+        <a:font script="Hans" typeface="等线"/>
+        <a:font script="Hant" typeface="新細明體"/>
+        <a:font script="Arab" typeface="Arial"/>
+        <a:font script="Hebr" typeface="Arial"/>
+        <a:font script="Thai" typeface="Cordia New"/>
+        <a:font script="Ethi" typeface="Nyala"/>
+        <a:font script="Beng" typeface="Vrinda"/>
+        <a:font script="Gujr" typeface="Shruti"/>
+        <a:font script="Khmr" typeface="DaunPenh"/>
+        <a:font script="Knda" typeface="Tunga"/>
+        <a:font script="Guru" typeface="Raavi"/>
+        <a:font script="Cans" typeface="Euphemia"/>
+        <a:font script="Cher" typeface="Plantagenet Cherokee"/>
+        <a:font script="Yiii" typeface="Microsoft Yi Baiti"/>
+        <a:font script="Tibt" typeface="Microsoft Himalaya"/>
+        <a:font script="Thaa" typeface="MV Boli"/>
+        <a:font script="Deva" typeface="Mangal"/>
+        <a:font script="Telu" typeface="Gautami"/>
+        <a:font script="Taml" typeface="Latha"/>
+        <a:font script="Syrc" typeface="Estrangelo Edessa"/>
+        <a:font script="Orya" typeface="Kalinga"/>
+        <a:font script="Mlym" typeface="Kartika"/>
+        <a:font script="Laoo" typeface="DokChampa"/>
+        <a:font script="Sinh" typeface="Iskoola Pota"/>
+        <a:font script="Mong" typeface="Mongolian Baiti"/>
+        <a:font script="Viet" typeface="Arial"/>
+        <a:font script="Uigh" typeface="Microsoft Uighur"/>
+        <a:font script="Geor" typeface="Sylfaen"/>
+        <a:font script="Armn" typeface="Arial"/>
+        <a:font script="Bugi" typeface="Leelawadee UI"/>
+        <a:font script="Bopo" typeface="Microsoft JhengHei"/>
+        <a:font script="Java" typeface="Javanese Text"/>
+        <a:font script="Lisu" typeface="Segoe UI"/>
+        <a:font script="Mymr" typeface="Myanmar Text"/>
+        <a:font script="Nkoo" typeface="Ebrima"/>
+        <a:font script="Olck" typeface="Nirmala UI"/>
+        <a:font script="Osma" typeface="Ebrima"/>
+        <a:font script="Phag" typeface="Phagspa"/>
+        <a:font script="Syrn" typeface="Estrangelo Edessa"/>
+        <a:font script="Syrj" typeface="Estrangelo Edessa"/>
+        <a:font script="Syre" typeface="Estrangelo Edessa"/>
+        <a:font script="Sora" typeface="Nirmala UI"/>
+        <a:font script="Tale" typeface="Microsoft Tai Le"/>
+        <a:font script="Talu" typeface="Microsoft New Tai Lue"/>
+        <a:font script="Tfng" typeface="Ebrima"/>
+      </a:minorFont>
+    </a:fontScheme>
+    <a:fmtScheme name="Office">
+      <a:fillStyleLst>
+        <a:solidFill>
+          <a:schemeClr val="phClr"/>
+        </a:solidFill>
+        <a:gradFill rotWithShape="1">
+          <a:gsLst>
+            <a:gs pos="0">
+              <a:schemeClr val="phClr">
+                <a:lumMod val="110000"/>
+                <a:satMod val="105000"/>
+                <a:tint val="67000"/>
+              </a:schemeClr>
+            </a:gs>
+            <a:gs pos="50000">
+              <a:schemeClr val="phClr">
+                <a:lumMod val="105000"/>
+                <a:satMod val="103000"/>
+                <a:tint val="73000"/>
+              </a:schemeClr>
+            </a:gs>
+            <a:gs pos="100000">
+              <a:schemeClr val="phClr">
+                <a:lumMod val="105000"/>
+                <a:satMod val="109000"/>
+                <a:tint val="81000"/>
+              </a:schemeClr>
+            </a:gs>
+          </a:gsLst>
+          <a:lin ang="5400000" scaled="0"/>
+        </a:gradFill>
+        <a:gradFill rotWithShape="1">
+          <a:gsLst>
+            <a:gs pos="0">
+              <a:schemeClr val="phClr">
+                <a:satMod val="103000"/>
+                <a:lumMod val="102000"/>
+                <a:tint val="94000"/>
+              </a:schemeClr>
+            </a:gs>
+            <a:gs pos="50000">
+              <a:schemeClr val="phClr">
+                <a:satMod val="110000"/>
+                <a:lumMod val="100000"/>
+                <a:shade val="100000"/>
+              </a:schemeClr>
+            </a:gs>
+            <a:gs pos="100000">
+              <a:schemeClr val="phClr">
+                <a:lumMod val="99000"/>
+                <a:satMod val="120000"/>
+                <a:shade val="78000"/>
+              </a:schemeClr>
+            </a:gs>
+          </a:gsLst>
+          <a:lin ang="5400000" scaled="0"/>
+        </a:gradFill>
+      </a:fillStyleLst>
+      <a:lnStyleLst>
+        <a:ln w="6350" cap="flat" cmpd="sng" algn="ctr">
+          <a:solidFill>
+            <a:schemeClr val="phClr"/>
+          </a:solidFill>
+          <a:prstDash val="solid"/>
+          <a:miter lim="800000"/>
+        </a:ln>
+        <a:ln w="12700" cap="flat" cmpd="sng" algn="ctr">
+          <a:solidFill>
+            <a:schemeClr val="phClr"/>
+          </a:solidFill>
+          <a:prstDash val="solid"/>
+          <a:miter lim="800000"/>
+        </a:ln>
+        <a:ln w="19050" cap="flat" cmpd="sng" algn="ctr">
+          <a:solidFill>
+            <a:schemeClr val="phClr"/>
+          </a:solidFill>
+          <a:prstDash val="solid"/>
+          <a:miter lim="800000"/>
+        </a:ln>
+      </a:lnStyleLst>
+      <a:effectStyleLst>
+        <a:effectStyle>
+          <a:effectLst/>
+        </a:effectStyle>
+        <a:effectStyle>
+          <a:effectLst/>
+        </a:effectStyle>
+        <a:effectStyle>
+          <a:effectLst>
+            <a:outerShdw blurRad="57150" dist="19050" dir="5400000" algn="ctr" rotWithShape="0">
+              <a:srgbClr val="000000">
+                <a:alpha val="63000"/>
+              </a:srgbClr>
+            </a:outerShdw>
+          </a:effectLst>
+        </a:effectStyle>
+      </a:effectStyleLst>
+      <a:bgFillStyleLst>
+        <a:solidFill>
+          <a:schemeClr val="phClr"/>
+        </a:solidFill>
+        <a:solidFill>
+          <a:schemeClr val="phClr">
+            <a:tint val="95000"/>
+            <a:satMod val="170000"/>
+          </a:schemeClr>
+        </a:solidFill>
+        <a:gradFill rotWithShape="1">
+          <a:gsLst>
+            <a:gs pos="0">
+              <a:schemeClr val="phClr">
+                <a:tint val="93000"/>
+                <a:satMod val="150000"/>
+                <a:shade val="98000"/>
+                <a:lumMod val="102000"/>
+              </a:schemeClr>
+            </a:gs>
+            <a:gs pos="50000">
+              <a:schemeClr val="phClr">
+                <a:tint val="98000"/>
+                <a:satMod val="130000"/>
+                <a:shade val="90000"/>
+                <a:lumMod val="103000"/>
+              </a:schemeClr>
+            </a:gs>
+            <a:gs pos="100000">
+              <a:schemeClr val="phClr">
+                <a:shade val="63000"/>
+                <a:satMod val="120000"/>
+              </a:schemeClr>
+            </a:gs>
+          </a:gsLst>
+          <a:lin ang="5400000" scaled="0"/>
+        </a:gradFill>
+      </a:bgFillStyleLst>
+    </a:fmtScheme>
+  </a:themeElements>
+  <a:objectDefaults/>
+  <a:extraClrSchemeLst/>
+  <a:extLst>
+    <a:ext uri="{05A4C25C-085E-4340-85A3-A5531E510DB2}">
+      <thm15:themeFamily xmlns:thm15="http://schemas.microsoft.com/office/thememl/2012/main" name="Office Theme" id="{62F939B6-93AF-4DB8-9C6B-D6C7DFDC589F}" vid="{4A3C46E8-61CC-4603-A589-7422A47A8E4A}"/>
+    </a:ext>
+  </a:extLst>
+</a:theme>
 </file>
</xml_diff>